<commit_message>
Update presentation with topic 1 - Question 1
</commit_message>
<xml_diff>
--- a/presentation/FGV-MBA - Monografia - Detecção de Máscara Facial.pptx
+++ b/presentation/FGV-MBA - Monografia - Detecção de Máscara Facial.pptx
@@ -7,29 +7,30 @@
     <p:sldMasterId id="2147483654" r:id="rId3"/>
   </p:sldMasterIdLst>
   <p:notesMasterIdLst>
-    <p:notesMasterId r:id="rId21"/>
+    <p:notesMasterId r:id="rId22"/>
   </p:notesMasterIdLst>
   <p:handoutMasterIdLst>
-    <p:handoutMasterId r:id="rId22"/>
+    <p:handoutMasterId r:id="rId23"/>
   </p:handoutMasterIdLst>
   <p:sldIdLst>
     <p:sldId id="351" r:id="rId4"/>
     <p:sldId id="346" r:id="rId5"/>
     <p:sldId id="371" r:id="rId6"/>
-    <p:sldId id="360" r:id="rId7"/>
-    <p:sldId id="361" r:id="rId8"/>
-    <p:sldId id="362" r:id="rId9"/>
-    <p:sldId id="363" r:id="rId10"/>
-    <p:sldId id="357" r:id="rId11"/>
-    <p:sldId id="364" r:id="rId12"/>
-    <p:sldId id="365" r:id="rId13"/>
-    <p:sldId id="358" r:id="rId14"/>
-    <p:sldId id="366" r:id="rId15"/>
-    <p:sldId id="359" r:id="rId16"/>
-    <p:sldId id="367" r:id="rId17"/>
-    <p:sldId id="368" r:id="rId18"/>
-    <p:sldId id="369" r:id="rId19"/>
-    <p:sldId id="370" r:id="rId20"/>
+    <p:sldId id="372" r:id="rId7"/>
+    <p:sldId id="360" r:id="rId8"/>
+    <p:sldId id="361" r:id="rId9"/>
+    <p:sldId id="362" r:id="rId10"/>
+    <p:sldId id="363" r:id="rId11"/>
+    <p:sldId id="357" r:id="rId12"/>
+    <p:sldId id="364" r:id="rId13"/>
+    <p:sldId id="365" r:id="rId14"/>
+    <p:sldId id="358" r:id="rId15"/>
+    <p:sldId id="366" r:id="rId16"/>
+    <p:sldId id="359" r:id="rId17"/>
+    <p:sldId id="367" r:id="rId18"/>
+    <p:sldId id="368" r:id="rId19"/>
+    <p:sldId id="369" r:id="rId20"/>
+    <p:sldId id="370" r:id="rId21"/>
   </p:sldIdLst>
   <p:sldSz cx="12192000" cy="6858000"/>
   <p:notesSz cx="6858000" cy="9144000"/>
@@ -142,7 +143,7 @@
 <file path=ppt/revisionInfo.xml><?xml version="1.0" encoding="utf-8"?>
 <p1510:revInfo xmlns:a="http://schemas.openxmlformats.org/drawingml/2006/main" xmlns:r="http://schemas.openxmlformats.org/officeDocument/2006/relationships" xmlns:p1510="http://schemas.microsoft.com/office/powerpoint/2015/10/main">
   <p1510:revLst>
-    <p1510:client id="{0C927506-5143-4A7D-B285-178AAC9CF657}" v="4" dt="2020-05-24T19:05:01.036"/>
+    <p1510:client id="{0C927506-5143-4A7D-B285-178AAC9CF657}" v="21" dt="2020-05-24T20:39:20.233"/>
     <p1510:client id="{7BA9A1FE-DBFD-4F2E-9BE2-09098A8CCE86}" v="56" dt="2020-05-24T17:53:39.811"/>
   </p1510:revLst>
 </p1510:revInfo>
@@ -309,19 +310,19 @@
   </pc:docChgLst>
   <pc:docChgLst>
     <pc:chgData name="Leandro Daniel" userId="682bb4abc622d264" providerId="LiveId" clId="{0C927506-5143-4A7D-B285-178AAC9CF657}"/>
-    <pc:docChg chg="addSld modSld">
-      <pc:chgData name="Leandro Daniel" userId="682bb4abc622d264" providerId="LiveId" clId="{0C927506-5143-4A7D-B285-178AAC9CF657}" dt="2020-05-24T19:05:03.465" v="576" actId="20577"/>
+    <pc:docChg chg="custSel addSld modSld">
+      <pc:chgData name="Leandro Daniel" userId="682bb4abc622d264" providerId="LiveId" clId="{0C927506-5143-4A7D-B285-178AAC9CF657}" dt="2020-05-24T20:39:47.908" v="2336" actId="20577"/>
       <pc:docMkLst>
         <pc:docMk/>
       </pc:docMkLst>
       <pc:sldChg chg="addSp modSp mod">
-        <pc:chgData name="Leandro Daniel" userId="682bb4abc622d264" providerId="LiveId" clId="{0C927506-5143-4A7D-B285-178AAC9CF657}" dt="2020-05-24T19:04:49.030" v="574" actId="20577"/>
+        <pc:chgData name="Leandro Daniel" userId="682bb4abc622d264" providerId="LiveId" clId="{0C927506-5143-4A7D-B285-178AAC9CF657}" dt="2020-05-24T20:06:37.345" v="1071" actId="20577"/>
         <pc:sldMkLst>
           <pc:docMk/>
           <pc:sldMk cId="351260889" sldId="346"/>
         </pc:sldMkLst>
         <pc:spChg chg="mod">
-          <ac:chgData name="Leandro Daniel" userId="682bb4abc622d264" providerId="LiveId" clId="{0C927506-5143-4A7D-B285-178AAC9CF657}" dt="2020-05-24T18:22:16.233" v="541" actId="20577"/>
+          <ac:chgData name="Leandro Daniel" userId="682bb4abc622d264" providerId="LiveId" clId="{0C927506-5143-4A7D-B285-178AAC9CF657}" dt="2020-05-24T20:06:37.345" v="1071" actId="20577"/>
           <ac:spMkLst>
             <pc:docMk/>
             <pc:sldMk cId="351260889" sldId="346"/>
@@ -329,7 +330,7 @@
           </ac:spMkLst>
         </pc:spChg>
         <pc:spChg chg="add mod">
-          <ac:chgData name="Leandro Daniel" userId="682bb4abc622d264" providerId="LiveId" clId="{0C927506-5143-4A7D-B285-178AAC9CF657}" dt="2020-05-24T19:04:49.030" v="574" actId="20577"/>
+          <ac:chgData name="Leandro Daniel" userId="682bb4abc622d264" providerId="LiveId" clId="{0C927506-5143-4A7D-B285-178AAC9CF657}" dt="2020-05-24T19:13:55.199" v="610" actId="20577"/>
           <ac:spMkLst>
             <pc:docMk/>
             <pc:sldMk cId="351260889" sldId="346"/>
@@ -337,20 +338,242 @@
           </ac:spMkLst>
         </pc:spChg>
       </pc:sldChg>
-      <pc:sldChg chg="addSp modSp add mod">
-        <pc:chgData name="Leandro Daniel" userId="682bb4abc622d264" providerId="LiveId" clId="{0C927506-5143-4A7D-B285-178AAC9CF657}" dt="2020-05-24T19:05:03.465" v="576" actId="20577"/>
+      <pc:sldChg chg="modSp mod">
+        <pc:chgData name="Leandro Daniel" userId="682bb4abc622d264" providerId="LiveId" clId="{0C927506-5143-4A7D-B285-178AAC9CF657}" dt="2020-05-24T20:15:03.308" v="1310" actId="20577"/>
+        <pc:sldMkLst>
+          <pc:docMk/>
+          <pc:sldMk cId="679871842" sldId="351"/>
+        </pc:sldMkLst>
+        <pc:spChg chg="mod">
+          <ac:chgData name="Leandro Daniel" userId="682bb4abc622d264" providerId="LiveId" clId="{0C927506-5143-4A7D-B285-178AAC9CF657}" dt="2020-05-24T20:15:03.308" v="1310" actId="20577"/>
+          <ac:spMkLst>
+            <pc:docMk/>
+            <pc:sldMk cId="679871842" sldId="351"/>
+            <ac:spMk id="2" creationId="{70F687BA-32A2-41BC-B72A-F28209A7F473}"/>
+          </ac:spMkLst>
+        </pc:spChg>
+      </pc:sldChg>
+      <pc:sldChg chg="addSp delSp modSp add mod">
+        <pc:chgData name="Leandro Daniel" userId="682bb4abc622d264" providerId="LiveId" clId="{0C927506-5143-4A7D-B285-178AAC9CF657}" dt="2020-05-24T20:13:46.032" v="1207" actId="20577"/>
         <pc:sldMkLst>
           <pc:docMk/>
           <pc:sldMk cId="3921174963" sldId="371"/>
         </pc:sldMkLst>
+        <pc:spChg chg="del mod">
+          <ac:chgData name="Leandro Daniel" userId="682bb4abc622d264" providerId="LiveId" clId="{0C927506-5143-4A7D-B285-178AAC9CF657}" dt="2020-05-24T19:20:16.220" v="922" actId="21"/>
+          <ac:spMkLst>
+            <pc:docMk/>
+            <pc:sldMk cId="3921174963" sldId="371"/>
+            <ac:spMk id="6" creationId="{D5F67441-A755-4247-851C-41974715F282}"/>
+          </ac:spMkLst>
+        </pc:spChg>
         <pc:spChg chg="add mod">
-          <ac:chgData name="Leandro Daniel" userId="682bb4abc622d264" providerId="LiveId" clId="{0C927506-5143-4A7D-B285-178AAC9CF657}" dt="2020-05-24T19:05:03.465" v="576" actId="20577"/>
+          <ac:chgData name="Leandro Daniel" userId="682bb4abc622d264" providerId="LiveId" clId="{0C927506-5143-4A7D-B285-178AAC9CF657}" dt="2020-05-24T19:13:50.901" v="609" actId="20577"/>
           <ac:spMkLst>
             <pc:docMk/>
             <pc:sldMk cId="3921174963" sldId="371"/>
             <ac:spMk id="7" creationId="{6F061871-FDA0-491B-B84B-B5AB0970885B}"/>
           </ac:spMkLst>
         </pc:spChg>
+        <pc:spChg chg="add del mod">
+          <ac:chgData name="Leandro Daniel" userId="682bb4abc622d264" providerId="LiveId" clId="{0C927506-5143-4A7D-B285-178AAC9CF657}" dt="2020-05-24T19:20:16.220" v="922" actId="21"/>
+          <ac:spMkLst>
+            <pc:docMk/>
+            <pc:sldMk cId="3921174963" sldId="371"/>
+            <ac:spMk id="11" creationId="{1A672CB9-5A04-4176-9D9E-55D7A9EF3CE4}"/>
+          </ac:spMkLst>
+        </pc:spChg>
+        <pc:spChg chg="add mod">
+          <ac:chgData name="Leandro Daniel" userId="682bb4abc622d264" providerId="LiveId" clId="{0C927506-5143-4A7D-B285-178AAC9CF657}" dt="2020-05-24T20:13:46.032" v="1207" actId="20577"/>
+          <ac:spMkLst>
+            <pc:docMk/>
+            <pc:sldMk cId="3921174963" sldId="371"/>
+            <ac:spMk id="14" creationId="{07CA8BF6-9A49-441F-836D-9072850A59D4}"/>
+          </ac:spMkLst>
+        </pc:spChg>
+        <pc:spChg chg="add mod">
+          <ac:chgData name="Leandro Daniel" userId="682bb4abc622d264" providerId="LiveId" clId="{0C927506-5143-4A7D-B285-178AAC9CF657}" dt="2020-05-24T20:11:30.806" v="1073" actId="20577"/>
+          <ac:spMkLst>
+            <pc:docMk/>
+            <pc:sldMk cId="3921174963" sldId="371"/>
+            <ac:spMk id="18" creationId="{E05EE9CB-CEAD-49FB-B917-F3911C866716}"/>
+          </ac:spMkLst>
+        </pc:spChg>
+        <pc:graphicFrameChg chg="add del mod">
+          <ac:chgData name="Leandro Daniel" userId="682bb4abc622d264" providerId="LiveId" clId="{0C927506-5143-4A7D-B285-178AAC9CF657}" dt="2020-05-24T19:08:11.585" v="588" actId="478"/>
+          <ac:graphicFrameMkLst>
+            <pc:docMk/>
+            <pc:sldMk cId="3921174963" sldId="371"/>
+            <ac:graphicFrameMk id="3" creationId="{439B052B-7ADE-4F71-97D8-530EF1CF479F}"/>
+          </ac:graphicFrameMkLst>
+        </pc:graphicFrameChg>
+        <pc:picChg chg="add del mod">
+          <ac:chgData name="Leandro Daniel" userId="682bb4abc622d264" providerId="LiveId" clId="{0C927506-5143-4A7D-B285-178AAC9CF657}" dt="2020-05-24T19:20:16.220" v="922" actId="21"/>
+          <ac:picMkLst>
+            <pc:docMk/>
+            <pc:sldMk cId="3921174963" sldId="371"/>
+            <ac:picMk id="8" creationId="{AC909D0D-3174-4A96-ACF9-9162A8A5ACEC}"/>
+          </ac:picMkLst>
+        </pc:picChg>
+        <pc:picChg chg="add del mod">
+          <ac:chgData name="Leandro Daniel" userId="682bb4abc622d264" providerId="LiveId" clId="{0C927506-5143-4A7D-B285-178AAC9CF657}" dt="2020-05-24T19:20:16.220" v="922" actId="21"/>
+          <ac:picMkLst>
+            <pc:docMk/>
+            <pc:sldMk cId="3921174963" sldId="371"/>
+            <ac:picMk id="9" creationId="{4E6ABAF2-18C9-4203-BEA1-09AE83E51337}"/>
+          </ac:picMkLst>
+        </pc:picChg>
+        <pc:picChg chg="add del mod">
+          <ac:chgData name="Leandro Daniel" userId="682bb4abc622d264" providerId="LiveId" clId="{0C927506-5143-4A7D-B285-178AAC9CF657}" dt="2020-05-24T19:20:16.220" v="922" actId="21"/>
+          <ac:picMkLst>
+            <pc:docMk/>
+            <pc:sldMk cId="3921174963" sldId="371"/>
+            <ac:picMk id="10" creationId="{98AB35B6-C01B-4BC7-9234-A61B0A25D67B}"/>
+          </ac:picMkLst>
+        </pc:picChg>
+        <pc:picChg chg="add mod">
+          <ac:chgData name="Leandro Daniel" userId="682bb4abc622d264" providerId="LiveId" clId="{0C927506-5143-4A7D-B285-178AAC9CF657}" dt="2020-05-24T19:20:21.954" v="924"/>
+          <ac:picMkLst>
+            <pc:docMk/>
+            <pc:sldMk cId="3921174963" sldId="371"/>
+            <ac:picMk id="15" creationId="{2F22A74C-3364-4DD1-BBA7-38E977DAC637}"/>
+          </ac:picMkLst>
+        </pc:picChg>
+        <pc:picChg chg="add mod">
+          <ac:chgData name="Leandro Daniel" userId="682bb4abc622d264" providerId="LiveId" clId="{0C927506-5143-4A7D-B285-178AAC9CF657}" dt="2020-05-24T20:05:01.027" v="943" actId="408"/>
+          <ac:picMkLst>
+            <pc:docMk/>
+            <pc:sldMk cId="3921174963" sldId="371"/>
+            <ac:picMk id="16" creationId="{B1A27C00-ABA4-4EE5-95D2-97D339292616}"/>
+          </ac:picMkLst>
+        </pc:picChg>
+        <pc:picChg chg="add mod">
+          <ac:chgData name="Leandro Daniel" userId="682bb4abc622d264" providerId="LiveId" clId="{0C927506-5143-4A7D-B285-178AAC9CF657}" dt="2020-05-24T20:04:51.283" v="941" actId="1076"/>
+          <ac:picMkLst>
+            <pc:docMk/>
+            <pc:sldMk cId="3921174963" sldId="371"/>
+            <ac:picMk id="17" creationId="{D6CEEE49-8720-460A-9FA7-E01A051D6D3D}"/>
+          </ac:picMkLst>
+        </pc:picChg>
+        <pc:cxnChg chg="add del mod">
+          <ac:chgData name="Leandro Daniel" userId="682bb4abc622d264" providerId="LiveId" clId="{0C927506-5143-4A7D-B285-178AAC9CF657}" dt="2020-05-24T19:20:16.220" v="922" actId="21"/>
+          <ac:cxnSpMkLst>
+            <pc:docMk/>
+            <pc:sldMk cId="3921174963" sldId="371"/>
+            <ac:cxnSpMk id="13" creationId="{461DF850-D789-480D-A92B-6F9C8AB2ED91}"/>
+          </ac:cxnSpMkLst>
+        </pc:cxnChg>
+        <pc:cxnChg chg="add mod">
+          <ac:chgData name="Leandro Daniel" userId="682bb4abc622d264" providerId="LiveId" clId="{0C927506-5143-4A7D-B285-178AAC9CF657}" dt="2020-05-24T19:20:21.954" v="924"/>
+          <ac:cxnSpMkLst>
+            <pc:docMk/>
+            <pc:sldMk cId="3921174963" sldId="371"/>
+            <ac:cxnSpMk id="19" creationId="{5E198959-BDE7-4419-BDC5-99C20E0B5EC8}"/>
+          </ac:cxnSpMkLst>
+        </pc:cxnChg>
+      </pc:sldChg>
+      <pc:sldChg chg="addSp delSp modSp add mod">
+        <pc:chgData name="Leandro Daniel" userId="682bb4abc622d264" providerId="LiveId" clId="{0C927506-5143-4A7D-B285-178AAC9CF657}" dt="2020-05-24T20:39:47.908" v="2336" actId="20577"/>
+        <pc:sldMkLst>
+          <pc:docMk/>
+          <pc:sldMk cId="1275928961" sldId="372"/>
+        </pc:sldMkLst>
+        <pc:spChg chg="del">
+          <ac:chgData name="Leandro Daniel" userId="682bb4abc622d264" providerId="LiveId" clId="{0C927506-5143-4A7D-B285-178AAC9CF657}" dt="2020-05-24T19:20:11.151" v="921" actId="478"/>
+          <ac:spMkLst>
+            <pc:docMk/>
+            <pc:sldMk cId="1275928961" sldId="372"/>
+            <ac:spMk id="6" creationId="{D5F67441-A755-4247-851C-41974715F282}"/>
+          </ac:spMkLst>
+        </pc:spChg>
+        <pc:spChg chg="mod">
+          <ac:chgData name="Leandro Daniel" userId="682bb4abc622d264" providerId="LiveId" clId="{0C927506-5143-4A7D-B285-178AAC9CF657}" dt="2020-05-24T19:13:45.033" v="608" actId="20577"/>
+          <ac:spMkLst>
+            <pc:docMk/>
+            <pc:sldMk cId="1275928961" sldId="372"/>
+            <ac:spMk id="7" creationId="{6F061871-FDA0-491B-B84B-B5AB0970885B}"/>
+          </ac:spMkLst>
+        </pc:spChg>
+        <pc:spChg chg="add del mod">
+          <ac:chgData name="Leandro Daniel" userId="682bb4abc622d264" providerId="LiveId" clId="{0C927506-5143-4A7D-B285-178AAC9CF657}" dt="2020-05-24T19:20:30.316" v="925" actId="478"/>
+          <ac:spMkLst>
+            <pc:docMk/>
+            <pc:sldMk cId="1275928961" sldId="372"/>
+            <ac:spMk id="11" creationId="{96D2EE0A-E21F-4805-9CCD-AE4D58E613E5}"/>
+          </ac:spMkLst>
+        </pc:spChg>
+        <pc:spChg chg="add del mod">
+          <ac:chgData name="Leandro Daniel" userId="682bb4abc622d264" providerId="LiveId" clId="{0C927506-5143-4A7D-B285-178AAC9CF657}" dt="2020-05-24T19:20:30.316" v="925" actId="478"/>
+          <ac:spMkLst>
+            <pc:docMk/>
+            <pc:sldMk cId="1275928961" sldId="372"/>
+            <ac:spMk id="15" creationId="{101961AE-8D08-4106-ACBA-2F8DAAC4EC0F}"/>
+          </ac:spMkLst>
+        </pc:spChg>
+        <pc:spChg chg="add mod">
+          <ac:chgData name="Leandro Daniel" userId="682bb4abc622d264" providerId="LiveId" clId="{0C927506-5143-4A7D-B285-178AAC9CF657}" dt="2020-05-24T20:39:47.908" v="2336" actId="20577"/>
+          <ac:spMkLst>
+            <pc:docMk/>
+            <pc:sldMk cId="1275928961" sldId="372"/>
+            <ac:spMk id="17" creationId="{0EACA767-5D74-4C51-98B7-763F041F495E}"/>
+          </ac:spMkLst>
+        </pc:spChg>
+        <pc:picChg chg="del">
+          <ac:chgData name="Leandro Daniel" userId="682bb4abc622d264" providerId="LiveId" clId="{0C927506-5143-4A7D-B285-178AAC9CF657}" dt="2020-05-24T19:20:11.151" v="921" actId="478"/>
+          <ac:picMkLst>
+            <pc:docMk/>
+            <pc:sldMk cId="1275928961" sldId="372"/>
+            <ac:picMk id="8" creationId="{AC909D0D-3174-4A96-ACF9-9162A8A5ACEC}"/>
+          </ac:picMkLst>
+        </pc:picChg>
+        <pc:picChg chg="del">
+          <ac:chgData name="Leandro Daniel" userId="682bb4abc622d264" providerId="LiveId" clId="{0C927506-5143-4A7D-B285-178AAC9CF657}" dt="2020-05-24T19:20:11.151" v="921" actId="478"/>
+          <ac:picMkLst>
+            <pc:docMk/>
+            <pc:sldMk cId="1275928961" sldId="372"/>
+            <ac:picMk id="9" creationId="{4E6ABAF2-18C9-4203-BEA1-09AE83E51337}"/>
+          </ac:picMkLst>
+        </pc:picChg>
+        <pc:picChg chg="del">
+          <ac:chgData name="Leandro Daniel" userId="682bb4abc622d264" providerId="LiveId" clId="{0C927506-5143-4A7D-B285-178AAC9CF657}" dt="2020-05-24T19:20:11.151" v="921" actId="478"/>
+          <ac:picMkLst>
+            <pc:docMk/>
+            <pc:sldMk cId="1275928961" sldId="372"/>
+            <ac:picMk id="10" creationId="{98AB35B6-C01B-4BC7-9234-A61B0A25D67B}"/>
+          </ac:picMkLst>
+        </pc:picChg>
+        <pc:picChg chg="add del mod">
+          <ac:chgData name="Leandro Daniel" userId="682bb4abc622d264" providerId="LiveId" clId="{0C927506-5143-4A7D-B285-178AAC9CF657}" dt="2020-05-24T19:20:30.316" v="925" actId="478"/>
+          <ac:picMkLst>
+            <pc:docMk/>
+            <pc:sldMk cId="1275928961" sldId="372"/>
+            <ac:picMk id="12" creationId="{6FBC6350-2952-468E-A4A5-5EAFFA9C1274}"/>
+          </ac:picMkLst>
+        </pc:picChg>
+        <pc:picChg chg="add del mod">
+          <ac:chgData name="Leandro Daniel" userId="682bb4abc622d264" providerId="LiveId" clId="{0C927506-5143-4A7D-B285-178AAC9CF657}" dt="2020-05-24T19:20:30.316" v="925" actId="478"/>
+          <ac:picMkLst>
+            <pc:docMk/>
+            <pc:sldMk cId="1275928961" sldId="372"/>
+            <ac:picMk id="13" creationId="{BAB79A15-E753-407A-B7F2-23D620DE7067}"/>
+          </ac:picMkLst>
+        </pc:picChg>
+        <pc:picChg chg="add del mod">
+          <ac:chgData name="Leandro Daniel" userId="682bb4abc622d264" providerId="LiveId" clId="{0C927506-5143-4A7D-B285-178AAC9CF657}" dt="2020-05-24T19:20:30.316" v="925" actId="478"/>
+          <ac:picMkLst>
+            <pc:docMk/>
+            <pc:sldMk cId="1275928961" sldId="372"/>
+            <ac:picMk id="14" creationId="{A4711A5A-BE4E-4692-9C78-47ACAF315FE3}"/>
+          </ac:picMkLst>
+        </pc:picChg>
+        <pc:cxnChg chg="add del mod">
+          <ac:chgData name="Leandro Daniel" userId="682bb4abc622d264" providerId="LiveId" clId="{0C927506-5143-4A7D-B285-178AAC9CF657}" dt="2020-05-24T19:20:30.316" v="925" actId="478"/>
+          <ac:cxnSpMkLst>
+            <pc:docMk/>
+            <pc:sldMk cId="1275928961" sldId="372"/>
+            <ac:cxnSpMk id="16" creationId="{EA648973-512C-4670-9344-A687D2E41ED4}"/>
+          </ac:cxnSpMkLst>
+        </pc:cxnChg>
       </pc:sldChg>
     </pc:docChg>
   </pc:docChgLst>
@@ -3621,7 +3844,23 @@
                   <a:schemeClr val="bg1"/>
                 </a:solidFill>
               </a:rPr>
-              <a:t>  Título da Monografia:</a:t>
+              <a:t>  Título da Monografia: (</a:t>
+            </a:r>
+            <a:r>
+              <a:rPr lang="pt-BR" sz="3600" b="1" dirty="0" err="1">
+                <a:solidFill>
+                  <a:schemeClr val="bg1"/>
+                </a:solidFill>
+              </a:rPr>
+              <a:t>to-do</a:t>
+            </a:r>
+            <a:r>
+              <a:rPr lang="pt-BR" sz="3600" b="1" dirty="0">
+                <a:solidFill>
+                  <a:schemeClr val="bg1"/>
+                </a:solidFill>
+              </a:rPr>
+              <a:t>)</a:t>
             </a:r>
           </a:p>
         </p:txBody>
@@ -4129,7 +4368,7 @@
         <p:spPr>
           <a:xfrm>
             <a:off x="176644" y="1355075"/>
-            <a:ext cx="11919876" cy="846835"/>
+            <a:ext cx="11919876" cy="462114"/>
           </a:xfrm>
           <a:prstGeom prst="rect">
             <a:avLst/>
@@ -4151,11 +4390,11 @@
             </a:pPr>
             <a:r>
               <a:rPr lang="pt-BR" sz="2400" dirty="0"/>
-              <a:t>- Quais técnicas estatísticas e/ou de </a:t>
+              <a:t>- Quais variáveis foram concebidas após aplicação de </a:t>
             </a:r>
             <a:r>
               <a:rPr lang="pt-BR" sz="2400" i="1" dirty="0" err="1"/>
-              <a:t>machine</a:t>
+              <a:t>feature</a:t>
             </a:r>
             <a:r>
               <a:rPr lang="pt-BR" sz="2400" i="1" dirty="0"/>
@@ -4163,11 +4402,11 @@
             </a:r>
             <a:r>
               <a:rPr lang="pt-BR" sz="2400" i="1" dirty="0" err="1"/>
-              <a:t>learning</a:t>
+              <a:t>engineering</a:t>
             </a:r>
             <a:r>
               <a:rPr lang="pt-BR" sz="2400" dirty="0"/>
-              <a:t> serão utilizadas (dentre as aprendidas no curso)?</a:t>
+              <a:t>?</a:t>
             </a:r>
           </a:p>
         </p:txBody>
@@ -4177,7 +4416,7 @@
           <p:cNvPr id="4" name="CaixaDeTexto 3">
             <a:extLst>
               <a:ext uri="{FF2B5EF4-FFF2-40B4-BE49-F238E27FC236}">
-                <a16:creationId xmlns:a16="http://schemas.microsoft.com/office/drawing/2014/main" id="{2CEABB78-1981-4542-9477-F6F9986CDBB1}"/>
+                <a16:creationId xmlns:a16="http://schemas.microsoft.com/office/drawing/2014/main" id="{C7463C38-0C64-417D-97DB-85F9C1B86AF4}"/>
               </a:ext>
             </a:extLst>
           </p:cNvPr>
@@ -4186,7 +4425,7 @@
         </p:nvSpPr>
         <p:spPr>
           <a:xfrm>
-            <a:off x="176644" y="2291511"/>
+            <a:off x="176644" y="2016087"/>
             <a:ext cx="11919876" cy="430887"/>
           </a:xfrm>
           <a:prstGeom prst="rect">
@@ -4213,7 +4452,7 @@
     </p:spTree>
     <p:extLst>
       <p:ext uri="{BB962C8B-B14F-4D97-AF65-F5344CB8AC3E}">
-        <p14:creationId xmlns:p14="http://schemas.microsoft.com/office/powerpoint/2010/main" val="303897569"/>
+        <p14:creationId xmlns:p14="http://schemas.microsoft.com/office/powerpoint/2010/main" val="1588210080"/>
       </p:ext>
     </p:extLst>
   </p:cSld>
@@ -4255,7 +4494,7 @@
         <p:spPr>
           <a:xfrm>
             <a:off x="176644" y="207818"/>
-            <a:ext cx="10619886" cy="523220"/>
+            <a:ext cx="10058026" cy="954107"/>
           </a:xfrm>
           <a:prstGeom prst="rect">
             <a:avLst/>
@@ -4274,7 +4513,31 @@
                   <a:schemeClr val="bg1"/>
                 </a:solidFill>
               </a:rPr>
-              <a:t>3) Referencial Teórico e Metodologia do Projeto Analítico</a:t>
+              <a:t>2) Base de Dados e Técnicas Estatísticas e/ou de </a:t>
+            </a:r>
+            <a:r>
+              <a:rPr lang="pt-BR" sz="2800" b="1" i="1" dirty="0" err="1">
+                <a:solidFill>
+                  <a:schemeClr val="bg1"/>
+                </a:solidFill>
+              </a:rPr>
+              <a:t>Machine</a:t>
+            </a:r>
+            <a:r>
+              <a:rPr lang="pt-BR" sz="2800" b="1" i="1" dirty="0">
+                <a:solidFill>
+                  <a:schemeClr val="bg1"/>
+                </a:solidFill>
+              </a:rPr>
+              <a:t> Learning</a:t>
+            </a:r>
+            <a:r>
+              <a:rPr lang="pt-BR" sz="2800" b="1" dirty="0">
+                <a:solidFill>
+                  <a:schemeClr val="bg1"/>
+                </a:solidFill>
+              </a:rPr>
+              <a:t> do Projeto Analítico</a:t>
             </a:r>
           </a:p>
         </p:txBody>
@@ -4284,7 +4547,7 @@
           <p:cNvPr id="3" name="Retângulo 2">
             <a:extLst>
               <a:ext uri="{FF2B5EF4-FFF2-40B4-BE49-F238E27FC236}">
-                <a16:creationId xmlns:a16="http://schemas.microsoft.com/office/drawing/2014/main" id="{0464F21F-CB9C-45F7-B671-AA1301672C7C}"/>
+                <a16:creationId xmlns:a16="http://schemas.microsoft.com/office/drawing/2014/main" id="{174208DE-0C00-40F4-A31A-3BC0AEE1B5CE}"/>
               </a:ext>
             </a:extLst>
           </p:cNvPr>
@@ -4294,7 +4557,7 @@
         <p:spPr>
           <a:xfrm>
             <a:off x="176644" y="1355075"/>
-            <a:ext cx="11919876" cy="462114"/>
+            <a:ext cx="11919876" cy="846835"/>
           </a:xfrm>
           <a:prstGeom prst="rect">
             <a:avLst/>
@@ -4309,58 +4572,30 @@
           </a:bodyPr>
           <a:lstStyle/>
           <a:p>
-            <a:pPr marL="15875" indent="-15875" algn="just">
+            <a:pPr marL="15875" indent="-15875">
               <a:lnSpc>
                 <a:spcPts val="3000"/>
               </a:lnSpc>
             </a:pPr>
             <a:r>
               <a:rPr lang="pt-BR" sz="2400" dirty="0"/>
-              <a:t>- </a:t>
-            </a:r>
-            <a:r>
-              <a:rPr lang="pt-BR" sz="2400" dirty="0">
-                <a:solidFill>
-                  <a:prstClr val="black"/>
-                </a:solidFill>
-              </a:rPr>
-              <a:t>Qual foi o </a:t>
-            </a:r>
-            <a:r>
-              <a:rPr lang="pt-BR" sz="2400" b="1" dirty="0">
-                <a:solidFill>
-                  <a:prstClr val="black"/>
-                </a:solidFill>
-              </a:rPr>
-              <a:t>REFERENCIAL TEÓRICO</a:t>
-            </a:r>
-            <a:r>
-              <a:rPr lang="pt-BR" sz="2400" dirty="0">
-                <a:solidFill>
-                  <a:prstClr val="black"/>
-                </a:solidFill>
-              </a:rPr>
-              <a:t> concebido (</a:t>
-            </a:r>
-            <a:r>
-              <a:rPr lang="pt-BR" sz="2400" b="1" dirty="0">
-                <a:solidFill>
-                  <a:prstClr val="black"/>
-                </a:solidFill>
-              </a:rPr>
-              <a:t>ler para a turma</a:t>
-            </a:r>
-            <a:r>
-              <a:rPr lang="pt-BR" sz="2400" dirty="0">
-                <a:solidFill>
-                  <a:prstClr val="black"/>
-                </a:solidFill>
-              </a:rPr>
-              <a:t>)</a:t>
+              <a:t>- Quais técnicas estatísticas e/ou de </a:t>
+            </a:r>
+            <a:r>
+              <a:rPr lang="pt-BR" sz="2400" i="1" dirty="0" err="1"/>
+              <a:t>machine</a:t>
+            </a:r>
+            <a:r>
+              <a:rPr lang="pt-BR" sz="2400" i="1" dirty="0"/>
+              <a:t> </a:t>
+            </a:r>
+            <a:r>
+              <a:rPr lang="pt-BR" sz="2400" i="1" dirty="0" err="1"/>
+              <a:t>learning</a:t>
             </a:r>
             <a:r>
               <a:rPr lang="pt-BR" sz="2400" dirty="0"/>
-              <a:t>?</a:t>
+              <a:t> serão utilizadas (dentre as aprendidas no curso)?</a:t>
             </a:r>
           </a:p>
         </p:txBody>
@@ -4370,7 +4605,7 @@
           <p:cNvPr id="4" name="CaixaDeTexto 3">
             <a:extLst>
               <a:ext uri="{FF2B5EF4-FFF2-40B4-BE49-F238E27FC236}">
-                <a16:creationId xmlns:a16="http://schemas.microsoft.com/office/drawing/2014/main" id="{2986ED32-27EE-4608-ACDA-A45D763B90F1}"/>
+                <a16:creationId xmlns:a16="http://schemas.microsoft.com/office/drawing/2014/main" id="{2CEABB78-1981-4542-9477-F6F9986CDBB1}"/>
               </a:ext>
             </a:extLst>
           </p:cNvPr>
@@ -4379,7 +4614,7 @@
         </p:nvSpPr>
         <p:spPr>
           <a:xfrm>
-            <a:off x="176644" y="2016087"/>
+            <a:off x="176644" y="2291511"/>
             <a:ext cx="11919876" cy="430887"/>
           </a:xfrm>
           <a:prstGeom prst="rect">
@@ -4406,7 +4641,7 @@
     </p:spTree>
     <p:extLst>
       <p:ext uri="{BB962C8B-B14F-4D97-AF65-F5344CB8AC3E}">
-        <p14:creationId xmlns:p14="http://schemas.microsoft.com/office/powerpoint/2010/main" val="2538997075"/>
+        <p14:creationId xmlns:p14="http://schemas.microsoft.com/office/powerpoint/2010/main" val="303897569"/>
       </p:ext>
     </p:extLst>
   </p:cSld>
@@ -4502,18 +4737,22 @@
           </a:bodyPr>
           <a:lstStyle/>
           <a:p>
-            <a:pPr marL="15875" lvl="0" indent="-15875" algn="just">
+            <a:pPr marL="15875" indent="-15875" algn="just">
               <a:lnSpc>
                 <a:spcPts val="3000"/>
               </a:lnSpc>
             </a:pPr>
             <a:r>
+              <a:rPr lang="pt-BR" sz="2400" dirty="0"/>
+              <a:t>- </a:t>
+            </a:r>
+            <a:r>
               <a:rPr lang="pt-BR" sz="2400" dirty="0">
                 <a:solidFill>
                   <a:prstClr val="black"/>
                 </a:solidFill>
               </a:rPr>
-              <a:t>- Qual é a </a:t>
+              <a:t>Qual foi o </a:t>
             </a:r>
             <a:r>
               <a:rPr lang="pt-BR" sz="2400" b="1" dirty="0">
@@ -4521,7 +4760,7 @@
                   <a:prstClr val="black"/>
                 </a:solidFill>
               </a:rPr>
-              <a:t>METODOLOGIA</a:t>
+              <a:t>REFERENCIAL TEÓRICO</a:t>
             </a:r>
             <a:r>
               <a:rPr lang="pt-BR" sz="2400" dirty="0">
@@ -4529,9 +4768,28 @@
                   <a:prstClr val="black"/>
                 </a:solidFill>
               </a:rPr>
-              <a:t> (procedimento passo a passo) da pesquisa?</a:t>
-            </a:r>
-            <a:endParaRPr lang="pt-BR" sz="2400" dirty="0"/>
+              <a:t> concebido (</a:t>
+            </a:r>
+            <a:r>
+              <a:rPr lang="pt-BR" sz="2400" b="1" dirty="0">
+                <a:solidFill>
+                  <a:prstClr val="black"/>
+                </a:solidFill>
+              </a:rPr>
+              <a:t>ler para a turma</a:t>
+            </a:r>
+            <a:r>
+              <a:rPr lang="pt-BR" sz="2400" dirty="0">
+                <a:solidFill>
+                  <a:prstClr val="black"/>
+                </a:solidFill>
+              </a:rPr>
+              <a:t>)</a:t>
+            </a:r>
+            <a:r>
+              <a:rPr lang="pt-BR" sz="2400" dirty="0"/>
+              <a:t>?</a:t>
+            </a:r>
           </a:p>
         </p:txBody>
       </p:sp>
@@ -4540,7 +4798,7 @@
           <p:cNvPr id="4" name="CaixaDeTexto 3">
             <a:extLst>
               <a:ext uri="{FF2B5EF4-FFF2-40B4-BE49-F238E27FC236}">
-                <a16:creationId xmlns:a16="http://schemas.microsoft.com/office/drawing/2014/main" id="{ACB5372C-5619-4615-BA99-8963D2DAED07}"/>
+                <a16:creationId xmlns:a16="http://schemas.microsoft.com/office/drawing/2014/main" id="{2986ED32-27EE-4608-ACDA-A45D763B90F1}"/>
               </a:ext>
             </a:extLst>
           </p:cNvPr>
@@ -4576,7 +4834,7 @@
     </p:spTree>
     <p:extLst>
       <p:ext uri="{BB962C8B-B14F-4D97-AF65-F5344CB8AC3E}">
-        <p14:creationId xmlns:p14="http://schemas.microsoft.com/office/powerpoint/2010/main" val="1046586723"/>
+        <p14:creationId xmlns:p14="http://schemas.microsoft.com/office/powerpoint/2010/main" val="2538997075"/>
       </p:ext>
     </p:extLst>
   </p:cSld>
@@ -4637,7 +4895,7 @@
                   <a:schemeClr val="bg1"/>
                 </a:solidFill>
               </a:rPr>
-              <a:t>4) Análise dos Dados e Resultados Encontrados</a:t>
+              <a:t>3) Referencial Teórico e Metodologia do Projeto Analítico</a:t>
             </a:r>
           </a:p>
         </p:txBody>
@@ -4647,7 +4905,7 @@
           <p:cNvPr id="3" name="Retângulo 2">
             <a:extLst>
               <a:ext uri="{FF2B5EF4-FFF2-40B4-BE49-F238E27FC236}">
-                <a16:creationId xmlns:a16="http://schemas.microsoft.com/office/drawing/2014/main" id="{6E4F48DF-7BE3-4E81-BCEE-F95E301A11C3}"/>
+                <a16:creationId xmlns:a16="http://schemas.microsoft.com/office/drawing/2014/main" id="{0464F21F-CB9C-45F7-B671-AA1301672C7C}"/>
               </a:ext>
             </a:extLst>
           </p:cNvPr>
@@ -4672,22 +4930,18 @@
           </a:bodyPr>
           <a:lstStyle/>
           <a:p>
-            <a:pPr marL="15875" indent="-15875" algn="just">
+            <a:pPr marL="15875" lvl="0" indent="-15875" algn="just">
               <a:lnSpc>
                 <a:spcPts val="3000"/>
               </a:lnSpc>
             </a:pPr>
             <a:r>
-              <a:rPr lang="pt-BR" sz="2400" dirty="0"/>
-              <a:t>- </a:t>
-            </a:r>
-            <a:r>
               <a:rPr lang="pt-BR" sz="2400" dirty="0">
                 <a:solidFill>
                   <a:prstClr val="black"/>
                 </a:solidFill>
               </a:rPr>
-              <a:t>Quais </a:t>
+              <a:t>- Qual é a </a:t>
             </a:r>
             <a:r>
               <a:rPr lang="pt-BR" sz="2400" b="1" dirty="0">
@@ -4695,7 +4949,7 @@
                   <a:prstClr val="black"/>
                 </a:solidFill>
               </a:rPr>
-              <a:t>RESULTADOS</a:t>
+              <a:t>METODOLOGIA</a:t>
             </a:r>
             <a:r>
               <a:rPr lang="pt-BR" sz="2400" dirty="0">
@@ -4703,12 +4957,9 @@
                   <a:prstClr val="black"/>
                 </a:solidFill>
               </a:rPr>
-              <a:t> foram encontrados na análise nos dados</a:t>
-            </a:r>
-            <a:r>
-              <a:rPr lang="pt-BR" sz="2400" dirty="0"/>
-              <a:t>?</a:t>
-            </a:r>
+              <a:t> (procedimento passo a passo) da pesquisa?</a:t>
+            </a:r>
+            <a:endParaRPr lang="pt-BR" sz="2400" dirty="0"/>
           </a:p>
         </p:txBody>
       </p:sp>
@@ -4717,7 +4968,7 @@
           <p:cNvPr id="4" name="CaixaDeTexto 3">
             <a:extLst>
               <a:ext uri="{FF2B5EF4-FFF2-40B4-BE49-F238E27FC236}">
-                <a16:creationId xmlns:a16="http://schemas.microsoft.com/office/drawing/2014/main" id="{5F96A4B5-BCBF-4128-AA58-68E853C4C0C1}"/>
+                <a16:creationId xmlns:a16="http://schemas.microsoft.com/office/drawing/2014/main" id="{ACB5372C-5619-4615-BA99-8963D2DAED07}"/>
               </a:ext>
             </a:extLst>
           </p:cNvPr>
@@ -4753,7 +5004,7 @@
     </p:spTree>
     <p:extLst>
       <p:ext uri="{BB962C8B-B14F-4D97-AF65-F5344CB8AC3E}">
-        <p14:creationId xmlns:p14="http://schemas.microsoft.com/office/powerpoint/2010/main" val="3932015321"/>
+        <p14:creationId xmlns:p14="http://schemas.microsoft.com/office/powerpoint/2010/main" val="1046586723"/>
       </p:ext>
     </p:extLst>
   </p:cSld>
@@ -4814,7 +5065,7 @@
                   <a:schemeClr val="bg1"/>
                 </a:solidFill>
               </a:rPr>
-              <a:t>5) Implicações Gerenciais e Conclusão do Projeto Analítico</a:t>
+              <a:t>4) Análise dos Dados e Resultados Encontrados</a:t>
             </a:r>
           </a:p>
         </p:txBody>
@@ -4849,18 +5100,22 @@
           </a:bodyPr>
           <a:lstStyle/>
           <a:p>
-            <a:pPr marL="15875" lvl="0" indent="-15875" algn="just">
+            <a:pPr marL="15875" indent="-15875" algn="just">
               <a:lnSpc>
                 <a:spcPts val="3000"/>
               </a:lnSpc>
             </a:pPr>
             <a:r>
+              <a:rPr lang="pt-BR" sz="2400" dirty="0"/>
+              <a:t>- </a:t>
+            </a:r>
+            <a:r>
               <a:rPr lang="pt-BR" sz="2400" dirty="0">
                 <a:solidFill>
                   <a:prstClr val="black"/>
                 </a:solidFill>
               </a:rPr>
-              <a:t>- Quais são as </a:t>
+              <a:t>Quais </a:t>
             </a:r>
             <a:r>
               <a:rPr lang="pt-BR" sz="2400" b="1" dirty="0">
@@ -4868,7 +5123,7 @@
                   <a:prstClr val="black"/>
                 </a:solidFill>
               </a:rPr>
-              <a:t>IMPLICAÇÕES GERENCIAIS</a:t>
+              <a:t>RESULTADOS</a:t>
             </a:r>
             <a:r>
               <a:rPr lang="pt-BR" sz="2400" dirty="0">
@@ -4876,7 +5131,11 @@
                   <a:prstClr val="black"/>
                 </a:solidFill>
               </a:rPr>
-              <a:t> da pesquisa?</a:t>
+              <a:t> foram encontrados na análise nos dados</a:t>
+            </a:r>
+            <a:r>
+              <a:rPr lang="pt-BR" sz="2400" dirty="0"/>
+              <a:t>?</a:t>
             </a:r>
           </a:p>
         </p:txBody>
@@ -4886,7 +5145,7 @@
           <p:cNvPr id="4" name="CaixaDeTexto 3">
             <a:extLst>
               <a:ext uri="{FF2B5EF4-FFF2-40B4-BE49-F238E27FC236}">
-                <a16:creationId xmlns:a16="http://schemas.microsoft.com/office/drawing/2014/main" id="{6BFF6B08-BA12-4A27-A6FB-E5AD25D2188C}"/>
+                <a16:creationId xmlns:a16="http://schemas.microsoft.com/office/drawing/2014/main" id="{5F96A4B5-BCBF-4128-AA58-68E853C4C0C1}"/>
               </a:ext>
             </a:extLst>
           </p:cNvPr>
@@ -4922,7 +5181,7 @@
     </p:spTree>
     <p:extLst>
       <p:ext uri="{BB962C8B-B14F-4D97-AF65-F5344CB8AC3E}">
-        <p14:creationId xmlns:p14="http://schemas.microsoft.com/office/powerpoint/2010/main" val="3981785778"/>
+        <p14:creationId xmlns:p14="http://schemas.microsoft.com/office/powerpoint/2010/main" val="3932015321"/>
       </p:ext>
     </p:extLst>
   </p:cSld>
@@ -5018,7 +5277,7 @@
           </a:bodyPr>
           <a:lstStyle/>
           <a:p>
-            <a:pPr marL="15875" indent="-15875" algn="just">
+            <a:pPr marL="15875" lvl="0" indent="-15875" algn="just">
               <a:lnSpc>
                 <a:spcPts val="3000"/>
               </a:lnSpc>
@@ -5029,7 +5288,7 @@
                   <a:prstClr val="black"/>
                 </a:solidFill>
               </a:rPr>
-              <a:t>- Quais foram as </a:t>
+              <a:t>- Quais são as </a:t>
             </a:r>
             <a:r>
               <a:rPr lang="pt-BR" sz="2400" b="1" dirty="0">
@@ -5037,7 +5296,7 @@
                   <a:prstClr val="black"/>
                 </a:solidFill>
               </a:rPr>
-              <a:t>LIMITAÇÕES</a:t>
+              <a:t>IMPLICAÇÕES GERENCIAIS</a:t>
             </a:r>
             <a:r>
               <a:rPr lang="pt-BR" sz="2400" dirty="0">
@@ -5055,7 +5314,7 @@
           <p:cNvPr id="4" name="CaixaDeTexto 3">
             <a:extLst>
               <a:ext uri="{FF2B5EF4-FFF2-40B4-BE49-F238E27FC236}">
-                <a16:creationId xmlns:a16="http://schemas.microsoft.com/office/drawing/2014/main" id="{D2E0FDAC-7CB4-4675-900E-00A8FF1FFE1A}"/>
+                <a16:creationId xmlns:a16="http://schemas.microsoft.com/office/drawing/2014/main" id="{6BFF6B08-BA12-4A27-A6FB-E5AD25D2188C}"/>
               </a:ext>
             </a:extLst>
           </p:cNvPr>
@@ -5091,7 +5350,7 @@
     </p:spTree>
     <p:extLst>
       <p:ext uri="{BB962C8B-B14F-4D97-AF65-F5344CB8AC3E}">
-        <p14:creationId xmlns:p14="http://schemas.microsoft.com/office/powerpoint/2010/main" val="1782597892"/>
+        <p14:creationId xmlns:p14="http://schemas.microsoft.com/office/powerpoint/2010/main" val="3981785778"/>
       </p:ext>
     </p:extLst>
   </p:cSld>
@@ -5198,6 +5457,175 @@
                   <a:prstClr val="black"/>
                 </a:solidFill>
               </a:rPr>
+              <a:t>- Quais foram as </a:t>
+            </a:r>
+            <a:r>
+              <a:rPr lang="pt-BR" sz="2400" b="1" dirty="0">
+                <a:solidFill>
+                  <a:prstClr val="black"/>
+                </a:solidFill>
+              </a:rPr>
+              <a:t>LIMITAÇÕES</a:t>
+            </a:r>
+            <a:r>
+              <a:rPr lang="pt-BR" sz="2400" dirty="0">
+                <a:solidFill>
+                  <a:prstClr val="black"/>
+                </a:solidFill>
+              </a:rPr>
+              <a:t> da pesquisa?</a:t>
+            </a:r>
+          </a:p>
+        </p:txBody>
+      </p:sp>
+      <p:sp>
+        <p:nvSpPr>
+          <p:cNvPr id="4" name="CaixaDeTexto 3">
+            <a:extLst>
+              <a:ext uri="{FF2B5EF4-FFF2-40B4-BE49-F238E27FC236}">
+                <a16:creationId xmlns:a16="http://schemas.microsoft.com/office/drawing/2014/main" id="{D2E0FDAC-7CB4-4675-900E-00A8FF1FFE1A}"/>
+              </a:ext>
+            </a:extLst>
+          </p:cNvPr>
+          <p:cNvSpPr txBox="1"/>
+          <p:nvPr/>
+        </p:nvSpPr>
+        <p:spPr>
+          <a:xfrm>
+            <a:off x="176644" y="2016087"/>
+            <a:ext cx="11919876" cy="430887"/>
+          </a:xfrm>
+          <a:prstGeom prst="rect">
+            <a:avLst/>
+          </a:prstGeom>
+          <a:noFill/>
+          <a:ln>
+            <a:noFill/>
+          </a:ln>
+        </p:spPr>
+        <p:txBody>
+          <a:bodyPr wrap="square" rtlCol="0">
+            <a:spAutoFit/>
+          </a:bodyPr>
+          <a:lstStyle/>
+          <a:p>
+            <a:r>
+              <a:rPr lang="pt-BR" sz="2200" i="1" dirty="0"/>
+              <a:t>Escrever aqui</a:t>
+            </a:r>
+          </a:p>
+        </p:txBody>
+      </p:sp>
+    </p:spTree>
+    <p:extLst>
+      <p:ext uri="{BB962C8B-B14F-4D97-AF65-F5344CB8AC3E}">
+        <p14:creationId xmlns:p14="http://schemas.microsoft.com/office/powerpoint/2010/main" val="1782597892"/>
+      </p:ext>
+    </p:extLst>
+  </p:cSld>
+  <p:clrMapOvr>
+    <a:masterClrMapping/>
+  </p:clrMapOvr>
+</p:sld>
+</file>
+
+<file path=ppt/slides/slide17.xml><?xml version="1.0" encoding="utf-8"?>
+<p:sld xmlns:a="http://schemas.openxmlformats.org/drawingml/2006/main" xmlns:r="http://schemas.openxmlformats.org/officeDocument/2006/relationships" xmlns:p="http://schemas.openxmlformats.org/presentationml/2006/main">
+  <p:cSld>
+    <p:spTree>
+      <p:nvGrpSpPr>
+        <p:cNvPr id="1" name=""/>
+        <p:cNvGrpSpPr/>
+        <p:nvPr/>
+      </p:nvGrpSpPr>
+      <p:grpSpPr>
+        <a:xfrm>
+          <a:off x="0" y="0"/>
+          <a:ext cx="0" cy="0"/>
+          <a:chOff x="0" y="0"/>
+          <a:chExt cx="0" cy="0"/>
+        </a:xfrm>
+      </p:grpSpPr>
+      <p:sp>
+        <p:nvSpPr>
+          <p:cNvPr id="2" name="CaixaDeTexto 1">
+            <a:extLst>
+              <a:ext uri="{FF2B5EF4-FFF2-40B4-BE49-F238E27FC236}">
+                <a16:creationId xmlns:a16="http://schemas.microsoft.com/office/drawing/2014/main" id="{E2289C40-6B36-4906-BF6F-3D1B594D6D57}"/>
+              </a:ext>
+            </a:extLst>
+          </p:cNvPr>
+          <p:cNvSpPr txBox="1"/>
+          <p:nvPr/>
+        </p:nvSpPr>
+        <p:spPr>
+          <a:xfrm>
+            <a:off x="176644" y="207818"/>
+            <a:ext cx="10619886" cy="523220"/>
+          </a:xfrm>
+          <a:prstGeom prst="rect">
+            <a:avLst/>
+          </a:prstGeom>
+          <a:noFill/>
+        </p:spPr>
+        <p:txBody>
+          <a:bodyPr wrap="square" rtlCol="0">
+            <a:spAutoFit/>
+          </a:bodyPr>
+          <a:lstStyle/>
+          <a:p>
+            <a:r>
+              <a:rPr lang="pt-BR" sz="2800" b="1" dirty="0">
+                <a:solidFill>
+                  <a:schemeClr val="bg1"/>
+                </a:solidFill>
+              </a:rPr>
+              <a:t>5) Implicações Gerenciais e Conclusão do Projeto Analítico</a:t>
+            </a:r>
+          </a:p>
+        </p:txBody>
+      </p:sp>
+      <p:sp>
+        <p:nvSpPr>
+          <p:cNvPr id="3" name="Retângulo 2">
+            <a:extLst>
+              <a:ext uri="{FF2B5EF4-FFF2-40B4-BE49-F238E27FC236}">
+                <a16:creationId xmlns:a16="http://schemas.microsoft.com/office/drawing/2014/main" id="{6E4F48DF-7BE3-4E81-BCEE-F95E301A11C3}"/>
+              </a:ext>
+            </a:extLst>
+          </p:cNvPr>
+          <p:cNvSpPr/>
+          <p:nvPr/>
+        </p:nvSpPr>
+        <p:spPr>
+          <a:xfrm>
+            <a:off x="176644" y="1355075"/>
+            <a:ext cx="11919876" cy="462114"/>
+          </a:xfrm>
+          <a:prstGeom prst="rect">
+            <a:avLst/>
+          </a:prstGeom>
+          <a:solidFill>
+            <a:srgbClr val="CDCDCD"/>
+          </a:solidFill>
+        </p:spPr>
+        <p:txBody>
+          <a:bodyPr wrap="square">
+            <a:spAutoFit/>
+          </a:bodyPr>
+          <a:lstStyle/>
+          <a:p>
+            <a:pPr marL="15875" indent="-15875" algn="just">
+              <a:lnSpc>
+                <a:spcPts val="3000"/>
+              </a:lnSpc>
+            </a:pPr>
+            <a:r>
+              <a:rPr lang="pt-BR" sz="2400" dirty="0">
+                <a:solidFill>
+                  <a:prstClr val="black"/>
+                </a:solidFill>
+              </a:rPr>
               <a:t>- Quais são as </a:t>
             </a:r>
             <a:r>
@@ -5286,7 +5714,7 @@
 </p:sld>
 </file>
 
-<file path=ppt/slides/slide17.xml><?xml version="1.0" encoding="utf-8"?>
+<file path=ppt/slides/slide18.xml><?xml version="1.0" encoding="utf-8"?>
 <p:sld xmlns:a="http://schemas.openxmlformats.org/drawingml/2006/main" xmlns:r="http://schemas.openxmlformats.org/officeDocument/2006/relationships" xmlns:p="http://schemas.openxmlformats.org/presentationml/2006/main">
   <p:cSld>
     <p:spTree>
@@ -5568,7 +5996,7 @@
         <p:spPr>
           <a:xfrm>
             <a:off x="176644" y="2016087"/>
-            <a:ext cx="11919876" cy="2462213"/>
+            <a:ext cx="11919876" cy="4154984"/>
           </a:xfrm>
           <a:prstGeom prst="rect">
             <a:avLst/>
@@ -5590,9 +6018,49 @@
             </a:r>
           </a:p>
           <a:p>
+            <a:endParaRPr lang="pt-PT" sz="2200" i="1" dirty="0"/>
+          </a:p>
+          <a:p>
+            <a:r>
+              <a:rPr lang="pt-PT" sz="2200" i="1" dirty="0"/>
+              <a:t>Com base nas evidências atuais, o vírus COVID-19 é transmitido entre pessoas através de contato próximo e gotículas</a:t>
+            </a:r>
             <a:r>
               <a:rPr lang="pt-BR" sz="2200" i="1" dirty="0"/>
-              <a:t>O vírus é altamente transmissível por gotículas e contato. Calcula-se que uma pessoa com infecção o transmita para de duas a quatro pessoas. A Organização Mundial de Saúde (OMS) recomenda o uso de máscaras combinadas com a correta higiene frequente das mãos como uma</a:t>
+              <a:t>. Calcula-se que uma pessoa com infecção o transmita para de duas a quatro pessoas. </a:t>
+            </a:r>
+          </a:p>
+          <a:p>
+            <a:endParaRPr lang="pt-BR" sz="2200" i="1" dirty="0"/>
+          </a:p>
+          <a:p>
+            <a:r>
+              <a:rPr lang="pt-BR" sz="2200" i="1" dirty="0"/>
+              <a:t>A Organização Mundial de Saúde (OMS) recomenda o uso de máscaras combinadas com a correta higiene frequente das mãos como parte da chamada EPI (Equipamento de Proteção Individual, do inglês PPE, ou </a:t>
+            </a:r>
+            <a:r>
+              <a:rPr lang="pt-BR" sz="2200" i="1" dirty="0" err="1"/>
+              <a:t>Personal</a:t>
+            </a:r>
+            <a:r>
+              <a:rPr lang="pt-BR" sz="2200" i="1" dirty="0"/>
+              <a:t> </a:t>
+            </a:r>
+            <a:r>
+              <a:rPr lang="pt-BR" sz="2200" i="1" dirty="0" err="1"/>
+              <a:t>Protective</a:t>
+            </a:r>
+            <a:r>
+              <a:rPr lang="pt-BR" sz="2200" i="1" dirty="0"/>
+              <a:t> </a:t>
+            </a:r>
+            <a:r>
+              <a:rPr lang="pt-BR" sz="2200" i="1" dirty="0" err="1"/>
+              <a:t>Equipment</a:t>
+            </a:r>
+            <a:r>
+              <a:rPr lang="pt-BR" sz="2200" i="1" dirty="0"/>
+              <a:t>).</a:t>
             </a:r>
           </a:p>
         </p:txBody>
@@ -5634,7 +6102,7 @@
             </a:pPr>
             <a:r>
               <a:rPr lang="pt-BR" dirty="0"/>
-              <a:t>[1 de 2]</a:t>
+              <a:t>[1 de 3]</a:t>
             </a:r>
           </a:p>
         </p:txBody>
@@ -5752,50 +6220,6 @@
       </p:sp>
       <p:sp>
         <p:nvSpPr>
-          <p:cNvPr id="6" name="CaixaDeTexto 5">
-            <a:extLst>
-              <a:ext uri="{FF2B5EF4-FFF2-40B4-BE49-F238E27FC236}">
-                <a16:creationId xmlns:a16="http://schemas.microsoft.com/office/drawing/2014/main" id="{D5F67441-A755-4247-851C-41974715F282}"/>
-              </a:ext>
-            </a:extLst>
-          </p:cNvPr>
-          <p:cNvSpPr txBox="1"/>
-          <p:nvPr/>
-        </p:nvSpPr>
-        <p:spPr>
-          <a:xfrm>
-            <a:off x="176644" y="2016087"/>
-            <a:ext cx="11919876" cy="2462213"/>
-          </a:xfrm>
-          <a:prstGeom prst="rect">
-            <a:avLst/>
-          </a:prstGeom>
-          <a:noFill/>
-          <a:ln>
-            <a:noFill/>
-          </a:ln>
-        </p:spPr>
-        <p:txBody>
-          <a:bodyPr wrap="square" rtlCol="0">
-            <a:spAutoFit/>
-          </a:bodyPr>
-          <a:lstStyle/>
-          <a:p>
-            <a:r>
-              <a:rPr lang="pt-BR" sz="2200" i="1" dirty="0"/>
-              <a:t>Vivemos tempos exponenciais, onde nossa sociedade enfrenta o desafio de combate e prevenção contra o crescente alastramento da COVID-19 em uma escala global. Deste desafiador contexto, emergem efeitos colaterais inéditos na era moderna, como o distanciamento social, dentre diversas mudanças de hábitos.</a:t>
-            </a:r>
-          </a:p>
-          <a:p>
-            <a:r>
-              <a:rPr lang="pt-BR" sz="2200" i="1" dirty="0"/>
-              <a:t>O vírus é altamente transmissível por gotículas e contato. Calcula-se que uma pessoa com infecção o transmita para de duas a quatro pessoas. A Organização Mundial de Saúde (OMS) recomenda o uso de máscaras combinadas com a correta higiene frequente das mãos como uma</a:t>
-            </a:r>
-          </a:p>
-        </p:txBody>
-      </p:sp>
-      <p:sp>
-        <p:nvSpPr>
           <p:cNvPr id="7" name="Retângulo 4">
             <a:extLst>
               <a:ext uri="{FF2B5EF4-FFF2-40B4-BE49-F238E27FC236}">
@@ -5831,11 +6255,249 @@
             </a:pPr>
             <a:r>
               <a:rPr lang="pt-BR" dirty="0"/>
-              <a:t>[2 de 2]</a:t>
+              <a:t>[2 de 3]</a:t>
             </a:r>
           </a:p>
         </p:txBody>
       </p:sp>
+      <p:sp>
+        <p:nvSpPr>
+          <p:cNvPr id="14" name="CaixaDeTexto 5">
+            <a:extLst>
+              <a:ext uri="{FF2B5EF4-FFF2-40B4-BE49-F238E27FC236}">
+                <a16:creationId xmlns:a16="http://schemas.microsoft.com/office/drawing/2014/main" id="{07CA8BF6-9A49-441F-836D-9072850A59D4}"/>
+              </a:ext>
+            </a:extLst>
+          </p:cNvPr>
+          <p:cNvSpPr txBox="1"/>
+          <p:nvPr/>
+        </p:nvSpPr>
+        <p:spPr>
+          <a:xfrm>
+            <a:off x="176644" y="2016087"/>
+            <a:ext cx="3251748" cy="4154984"/>
+          </a:xfrm>
+          <a:prstGeom prst="rect">
+            <a:avLst/>
+          </a:prstGeom>
+          <a:noFill/>
+          <a:ln>
+            <a:noFill/>
+          </a:ln>
+        </p:spPr>
+        <p:txBody>
+          <a:bodyPr wrap="square" rtlCol="0">
+            <a:spAutoFit/>
+          </a:bodyPr>
+          <a:lstStyle/>
+          <a:p>
+            <a:r>
+              <a:rPr lang="pt-BR" sz="2200" i="1" dirty="0"/>
+              <a:t>A Organização Mundial de Saúde disponibiliza uma série de orientações e guias para o uso correto das máscaras, bem com seu descarte e combinação com procedimentos de lavagem das mãos, como uma das medidas possíveis de contenção do alastramento da </a:t>
+            </a:r>
+          </a:p>
+          <a:p>
+            <a:r>
+              <a:rPr lang="pt-BR" sz="2200" i="1" dirty="0"/>
+              <a:t>COVID-19.</a:t>
+            </a:r>
+          </a:p>
+        </p:txBody>
+      </p:sp>
+      <p:pic>
+        <p:nvPicPr>
+          <p:cNvPr id="15" name="Picture 14" descr="A screenshot of a cell phone&#10;&#10;Description automatically generated">
+            <a:extLst>
+              <a:ext uri="{FF2B5EF4-FFF2-40B4-BE49-F238E27FC236}">
+                <a16:creationId xmlns:a16="http://schemas.microsoft.com/office/drawing/2014/main" id="{2F22A74C-3364-4DD1-BBA7-38E977DAC637}"/>
+              </a:ext>
+            </a:extLst>
+          </p:cNvPr>
+          <p:cNvPicPr>
+            <a:picLocks noChangeAspect="1"/>
+          </p:cNvPicPr>
+          <p:nvPr/>
+        </p:nvPicPr>
+        <p:blipFill>
+          <a:blip r:embed="rId2">
+            <a:extLst>
+              <a:ext uri="{28A0092B-C50C-407E-A947-70E740481C1C}">
+                <a14:useLocalDpi xmlns:a14="http://schemas.microsoft.com/office/drawing/2010/main" val="0"/>
+              </a:ext>
+            </a:extLst>
+          </a:blip>
+          <a:stretch>
+            <a:fillRect/>
+          </a:stretch>
+        </p:blipFill>
+        <p:spPr>
+          <a:xfrm>
+            <a:off x="9289299" y="2010337"/>
+            <a:ext cx="2807221" cy="3967660"/>
+          </a:xfrm>
+          <a:prstGeom prst="rect">
+            <a:avLst/>
+          </a:prstGeom>
+        </p:spPr>
+      </p:pic>
+      <p:pic>
+        <p:nvPicPr>
+          <p:cNvPr id="16" name="Picture 15">
+            <a:extLst>
+              <a:ext uri="{FF2B5EF4-FFF2-40B4-BE49-F238E27FC236}">
+                <a16:creationId xmlns:a16="http://schemas.microsoft.com/office/drawing/2014/main" id="{B1A27C00-ABA4-4EE5-95D2-97D339292616}"/>
+              </a:ext>
+            </a:extLst>
+          </p:cNvPr>
+          <p:cNvPicPr>
+            <a:picLocks noChangeAspect="1"/>
+          </p:cNvPicPr>
+          <p:nvPr/>
+        </p:nvPicPr>
+        <p:blipFill>
+          <a:blip r:embed="rId3"/>
+          <a:stretch>
+            <a:fillRect/>
+          </a:stretch>
+        </p:blipFill>
+        <p:spPr>
+          <a:xfrm>
+            <a:off x="6420744" y="2010337"/>
+            <a:ext cx="2794669" cy="3967660"/>
+          </a:xfrm>
+          <a:prstGeom prst="rect">
+            <a:avLst/>
+          </a:prstGeom>
+        </p:spPr>
+      </p:pic>
+      <p:pic>
+        <p:nvPicPr>
+          <p:cNvPr id="17" name="Picture 16">
+            <a:extLst>
+              <a:ext uri="{FF2B5EF4-FFF2-40B4-BE49-F238E27FC236}">
+                <a16:creationId xmlns:a16="http://schemas.microsoft.com/office/drawing/2014/main" id="{D6CEEE49-8720-460A-9FA7-E01A051D6D3D}"/>
+              </a:ext>
+            </a:extLst>
+          </p:cNvPr>
+          <p:cNvPicPr>
+            <a:picLocks noChangeAspect="1"/>
+          </p:cNvPicPr>
+          <p:nvPr/>
+        </p:nvPicPr>
+        <p:blipFill>
+          <a:blip r:embed="rId4"/>
+          <a:stretch>
+            <a:fillRect/>
+          </a:stretch>
+        </p:blipFill>
+        <p:spPr>
+          <a:xfrm>
+            <a:off x="3519659" y="2010337"/>
+            <a:ext cx="2827198" cy="3967660"/>
+          </a:xfrm>
+          <a:prstGeom prst="rect">
+            <a:avLst/>
+          </a:prstGeom>
+        </p:spPr>
+      </p:pic>
+      <p:sp>
+        <p:nvSpPr>
+          <p:cNvPr id="18" name="CaixaDeTexto 5">
+            <a:extLst>
+              <a:ext uri="{FF2B5EF4-FFF2-40B4-BE49-F238E27FC236}">
+                <a16:creationId xmlns:a16="http://schemas.microsoft.com/office/drawing/2014/main" id="{E05EE9CB-CEAD-49FB-B917-F3911C866716}"/>
+              </a:ext>
+            </a:extLst>
+          </p:cNvPr>
+          <p:cNvSpPr txBox="1"/>
+          <p:nvPr/>
+        </p:nvSpPr>
+        <p:spPr>
+          <a:xfrm>
+            <a:off x="176644" y="6220657"/>
+            <a:ext cx="11867132" cy="577081"/>
+          </a:xfrm>
+          <a:prstGeom prst="rect">
+            <a:avLst/>
+          </a:prstGeom>
+          <a:noFill/>
+          <a:ln>
+            <a:noFill/>
+          </a:ln>
+        </p:spPr>
+        <p:txBody>
+          <a:bodyPr wrap="square" rtlCol="0">
+            <a:spAutoFit/>
+          </a:bodyPr>
+          <a:lstStyle/>
+          <a:p>
+            <a:r>
+              <a:rPr lang="pt-BR" sz="1050" b="1" i="1" dirty="0"/>
+              <a:t>Fonte(s) e URL(s) utilizada(s) em 24/05/2020:</a:t>
+            </a:r>
+          </a:p>
+          <a:p>
+            <a:r>
+              <a:rPr lang="en-US" sz="1050" dirty="0"/>
+              <a:t>Coronavirus disease (COVID-19) advice for the public: When and how to use masks</a:t>
+            </a:r>
+            <a:br>
+              <a:rPr lang="en-US" sz="1050" dirty="0"/>
+            </a:br>
+            <a:r>
+              <a:rPr lang="pt-BR" sz="1050" i="1" dirty="0">
+                <a:hlinkClick r:id="rId5"/>
+              </a:rPr>
+              <a:t>https://www.who.int/emergencies/diseases/novel-coronavirus-2019/advice-for-public/when-and-how-to-use-masks</a:t>
+            </a:r>
+            <a:r>
+              <a:rPr lang="pt-BR" sz="1050" i="1" dirty="0"/>
+              <a:t> </a:t>
+            </a:r>
+          </a:p>
+        </p:txBody>
+      </p:sp>
+      <p:cxnSp>
+        <p:nvCxnSpPr>
+          <p:cNvPr id="19" name="Straight Connector 18">
+            <a:extLst>
+              <a:ext uri="{FF2B5EF4-FFF2-40B4-BE49-F238E27FC236}">
+                <a16:creationId xmlns:a16="http://schemas.microsoft.com/office/drawing/2014/main" id="{5E198959-BDE7-4419-BDC5-99C20E0B5EC8}"/>
+              </a:ext>
+            </a:extLst>
+          </p:cNvPr>
+          <p:cNvCxnSpPr/>
+          <p:nvPr/>
+        </p:nvCxnSpPr>
+        <p:spPr>
+          <a:xfrm>
+            <a:off x="269310" y="6203352"/>
+            <a:ext cx="1528175" cy="0"/>
+          </a:xfrm>
+          <a:prstGeom prst="line">
+            <a:avLst/>
+          </a:prstGeom>
+          <a:ln>
+            <a:solidFill>
+              <a:srgbClr val="1B2C62"/>
+            </a:solidFill>
+          </a:ln>
+        </p:spPr>
+        <p:style>
+          <a:lnRef idx="1">
+            <a:schemeClr val="accent1"/>
+          </a:lnRef>
+          <a:fillRef idx="0">
+            <a:schemeClr val="accent1"/>
+          </a:fillRef>
+          <a:effectRef idx="0">
+            <a:schemeClr val="accent1"/>
+          </a:effectRef>
+          <a:fontRef idx="minor">
+            <a:schemeClr val="tx1"/>
+          </a:fontRef>
+        </p:style>
+      </p:cxnSp>
     </p:spTree>
     <p:extLst>
       <p:ext uri="{BB962C8B-B14F-4D97-AF65-F5344CB8AC3E}">
@@ -5942,33 +6604,59 @@
             </a:pPr>
             <a:r>
               <a:rPr lang="pt-BR" sz="2400" dirty="0"/>
-              <a:t>- Qual é a </a:t>
-            </a:r>
-            <a:r>
-              <a:rPr lang="pt-BR" sz="2400" b="1" dirty="0"/>
-              <a:t>PERGUNTA </a:t>
-            </a:r>
-            <a:r>
-              <a:rPr lang="pt-BR" sz="2400" dirty="0"/>
-              <a:t>do</a:t>
-            </a:r>
-            <a:r>
-              <a:rPr lang="pt-BR" sz="2400" b="1" dirty="0"/>
-              <a:t> PROBLEMA</a:t>
-            </a:r>
-            <a:r>
-              <a:rPr lang="pt-BR" sz="2400" dirty="0"/>
-              <a:t> de pesquisa?</a:t>
+              <a:t>- Onde a pesquisa será realizada (contexto)?</a:t>
             </a:r>
           </a:p>
         </p:txBody>
       </p:sp>
       <p:sp>
         <p:nvSpPr>
-          <p:cNvPr id="4" name="CaixaDeTexto 3">
+          <p:cNvPr id="7" name="Retângulo 4">
             <a:extLst>
               <a:ext uri="{FF2B5EF4-FFF2-40B4-BE49-F238E27FC236}">
-                <a16:creationId xmlns:a16="http://schemas.microsoft.com/office/drawing/2014/main" id="{6C14915E-E529-4FEB-989B-94707A646704}"/>
+                <a16:creationId xmlns:a16="http://schemas.microsoft.com/office/drawing/2014/main" id="{6F061871-FDA0-491B-B84B-B5AB0970885B}"/>
+              </a:ext>
+            </a:extLst>
+          </p:cNvPr>
+          <p:cNvSpPr/>
+          <p:nvPr/>
+        </p:nvSpPr>
+        <p:spPr>
+          <a:xfrm>
+            <a:off x="11311003" y="1355074"/>
+            <a:ext cx="785517" cy="462113"/>
+          </a:xfrm>
+          <a:prstGeom prst="rect">
+            <a:avLst/>
+          </a:prstGeom>
+          <a:solidFill>
+            <a:srgbClr val="CDCDCD"/>
+          </a:solidFill>
+        </p:spPr>
+        <p:txBody>
+          <a:bodyPr wrap="none" lIns="0" tIns="0" rIns="0" bIns="91440" anchor="ctr" anchorCtr="1">
+            <a:noAutofit/>
+          </a:bodyPr>
+          <a:lstStyle/>
+          <a:p>
+            <a:pPr marL="15875" indent="-15875" algn="ctr">
+              <a:lnSpc>
+                <a:spcPts val="3000"/>
+              </a:lnSpc>
+            </a:pPr>
+            <a:r>
+              <a:rPr lang="pt-BR" dirty="0"/>
+              <a:t>[3 de 3]</a:t>
+            </a:r>
+          </a:p>
+        </p:txBody>
+      </p:sp>
+      <p:sp>
+        <p:nvSpPr>
+          <p:cNvPr id="17" name="CaixaDeTexto 5">
+            <a:extLst>
+              <a:ext uri="{FF2B5EF4-FFF2-40B4-BE49-F238E27FC236}">
+                <a16:creationId xmlns:a16="http://schemas.microsoft.com/office/drawing/2014/main" id="{0EACA767-5D74-4C51-98B7-763F041F495E}"/>
               </a:ext>
             </a:extLst>
           </p:cNvPr>
@@ -5978,7 +6666,7 @@
         <p:spPr>
           <a:xfrm>
             <a:off x="176644" y="2016087"/>
-            <a:ext cx="11919876" cy="430887"/>
+            <a:ext cx="11919876" cy="3816429"/>
           </a:xfrm>
           <a:prstGeom prst="rect">
             <a:avLst/>
@@ -5996,7 +6684,40 @@
           <a:p>
             <a:r>
               <a:rPr lang="pt-BR" sz="2200" i="1" dirty="0"/>
-              <a:t>Escrever aqui</a:t>
+              <a:t>A presente pesquisa tem como objetivo principal, desenvolver possibilidades de aplicação de Deep Learning, utilizando um </a:t>
+            </a:r>
+            <a:r>
+              <a:rPr lang="pt-BR" sz="2200" i="1" dirty="0" err="1"/>
+              <a:t>stacking</a:t>
+            </a:r>
+            <a:r>
+              <a:rPr lang="pt-BR" sz="2200" i="1" dirty="0"/>
+              <a:t> de técnicas (como por exemplo, </a:t>
+            </a:r>
+            <a:r>
+              <a:rPr lang="en-US" sz="2200" i="1" dirty="0"/>
+              <a:t>CNN + </a:t>
+            </a:r>
+            <a:r>
+              <a:rPr lang="en-US" sz="2200" i="1" dirty="0" err="1"/>
+              <a:t>XGBoost</a:t>
+            </a:r>
+            <a:r>
+              <a:rPr lang="en-US" sz="2200" i="1" dirty="0"/>
+              <a:t> (stacking) com Bayesian Optimization</a:t>
+            </a:r>
+            <a:r>
+              <a:rPr lang="pt-BR" sz="2200" i="1" dirty="0"/>
+              <a:t>), para uso na detecção de indivíduos utilizando máscaras faciais como ferramenta de monitoramento de medidas preventivas ao alastramento da COVID-19 em locais e áreas de convívio público ou privado.</a:t>
+            </a:r>
+          </a:p>
+          <a:p>
+            <a:endParaRPr lang="pt-BR" sz="2200" i="1" dirty="0"/>
+          </a:p>
+          <a:p>
+            <a:r>
+              <a:rPr lang="pt-BR" sz="2200" i="1" dirty="0"/>
+              <a:t>O modelo resultante do estudo, visa sua aplicação em sistemas de monitoramento por vídeo como uma ferramenta adicional de alerta em casos de pessoas que não estejam utilizando máscaras faciais. Podendo adicionalmente, ser empregado em combinação com materiais educacionais na orientação do adequado uso em estabelecimentos comerciais e artísticos, instituições de ensino ou quaisquer outros usos onde as corretas orientações científicas possam ser asseguradas de forma rápida e ampla.</a:t>
             </a:r>
           </a:p>
         </p:txBody>
@@ -6004,7 +6725,7 @@
     </p:spTree>
     <p:extLst>
       <p:ext uri="{BB962C8B-B14F-4D97-AF65-F5344CB8AC3E}">
-        <p14:creationId xmlns:p14="http://schemas.microsoft.com/office/powerpoint/2010/main" val="3817115773"/>
+        <p14:creationId xmlns:p14="http://schemas.microsoft.com/office/powerpoint/2010/main" val="1275928961"/>
       </p:ext>
     </p:extLst>
   </p:cSld>
@@ -6107,23 +6828,23 @@
             </a:pPr>
             <a:r>
               <a:rPr lang="pt-BR" sz="2400" dirty="0"/>
-              <a:t>- Qual é o </a:t>
+              <a:t>- Qual é a </a:t>
             </a:r>
             <a:r>
               <a:rPr lang="pt-BR" sz="2400" b="1" dirty="0"/>
-              <a:t>OBJETIVO GERAL</a:t>
+              <a:t>PERGUNTA </a:t>
             </a:r>
             <a:r>
               <a:rPr lang="pt-BR" sz="2400" dirty="0"/>
-              <a:t> e quais são os </a:t>
+              <a:t>do</a:t>
             </a:r>
             <a:r>
               <a:rPr lang="pt-BR" sz="2400" b="1" dirty="0"/>
-              <a:t>OBJETIVOS ESPECÍFICOS</a:t>
+              <a:t> PROBLEMA</a:t>
             </a:r>
             <a:r>
               <a:rPr lang="pt-BR" sz="2400" dirty="0"/>
-              <a:t>?</a:t>
+              <a:t> de pesquisa?</a:t>
             </a:r>
           </a:p>
         </p:txBody>
@@ -6133,7 +6854,7 @@
           <p:cNvPr id="4" name="CaixaDeTexto 3">
             <a:extLst>
               <a:ext uri="{FF2B5EF4-FFF2-40B4-BE49-F238E27FC236}">
-                <a16:creationId xmlns:a16="http://schemas.microsoft.com/office/drawing/2014/main" id="{84CA2768-938F-4EEA-B0DD-BAF05149B6F5}"/>
+                <a16:creationId xmlns:a16="http://schemas.microsoft.com/office/drawing/2014/main" id="{6C14915E-E529-4FEB-989B-94707A646704}"/>
               </a:ext>
             </a:extLst>
           </p:cNvPr>
@@ -6169,7 +6890,7 @@
     </p:spTree>
     <p:extLst>
       <p:ext uri="{BB962C8B-B14F-4D97-AF65-F5344CB8AC3E}">
-        <p14:creationId xmlns:p14="http://schemas.microsoft.com/office/powerpoint/2010/main" val="3953857876"/>
+        <p14:creationId xmlns:p14="http://schemas.microsoft.com/office/powerpoint/2010/main" val="3817115773"/>
       </p:ext>
     </p:extLst>
   </p:cSld>
@@ -6272,15 +6993,23 @@
             </a:pPr>
             <a:r>
               <a:rPr lang="pt-BR" sz="2400" dirty="0"/>
-              <a:t>- Quais são as </a:t>
+              <a:t>- Qual é o </a:t>
             </a:r>
             <a:r>
               <a:rPr lang="pt-BR" sz="2400" b="1" dirty="0"/>
-              <a:t>HIPÓTESES</a:t>
+              <a:t>OBJETIVO GERAL</a:t>
             </a:r>
             <a:r>
               <a:rPr lang="pt-BR" sz="2400" dirty="0"/>
-              <a:t> da pesquisa (se necessário)?</a:t>
+              <a:t> e quais são os </a:t>
+            </a:r>
+            <a:r>
+              <a:rPr lang="pt-BR" sz="2400" b="1" dirty="0"/>
+              <a:t>OBJETIVOS ESPECÍFICOS</a:t>
+            </a:r>
+            <a:r>
+              <a:rPr lang="pt-BR" sz="2400" dirty="0"/>
+              <a:t>?</a:t>
             </a:r>
           </a:p>
         </p:txBody>
@@ -6290,7 +7019,7 @@
           <p:cNvPr id="4" name="CaixaDeTexto 3">
             <a:extLst>
               <a:ext uri="{FF2B5EF4-FFF2-40B4-BE49-F238E27FC236}">
-                <a16:creationId xmlns:a16="http://schemas.microsoft.com/office/drawing/2014/main" id="{201C3BF0-3DB6-45FE-ABB3-0E8206DE61D9}"/>
+                <a16:creationId xmlns:a16="http://schemas.microsoft.com/office/drawing/2014/main" id="{84CA2768-938F-4EEA-B0DD-BAF05149B6F5}"/>
               </a:ext>
             </a:extLst>
           </p:cNvPr>
@@ -6326,7 +7055,7 @@
     </p:spTree>
     <p:extLst>
       <p:ext uri="{BB962C8B-B14F-4D97-AF65-F5344CB8AC3E}">
-        <p14:creationId xmlns:p14="http://schemas.microsoft.com/office/powerpoint/2010/main" val="1702763331"/>
+        <p14:creationId xmlns:p14="http://schemas.microsoft.com/office/powerpoint/2010/main" val="3953857876"/>
       </p:ext>
     </p:extLst>
   </p:cSld>
@@ -6407,7 +7136,7 @@
         <p:spPr>
           <a:xfrm>
             <a:off x="176644" y="1355075"/>
-            <a:ext cx="11919876" cy="1231556"/>
+            <a:ext cx="11919876" cy="462114"/>
           </a:xfrm>
           <a:prstGeom prst="rect">
             <a:avLst/>
@@ -6429,31 +7158,15 @@
             </a:pPr>
             <a:r>
               <a:rPr lang="pt-BR" sz="2400" dirty="0"/>
-              <a:t>- Quais artigos científicos já trataram do mesmo contexto e/ou utilizaram as mesmas técnicas estatísticas e/ou de </a:t>
-            </a:r>
-            <a:r>
-              <a:rPr lang="pt-BR" sz="2400" i="1" dirty="0" err="1"/>
-              <a:t>machine</a:t>
-            </a:r>
-            <a:r>
-              <a:rPr lang="pt-BR" sz="2400" i="1" dirty="0"/>
-              <a:t> </a:t>
-            </a:r>
-            <a:r>
-              <a:rPr lang="pt-BR" sz="2400" i="1" dirty="0" err="1"/>
-              <a:t>learning</a:t>
+              <a:t>- Quais são as </a:t>
+            </a:r>
+            <a:r>
+              <a:rPr lang="pt-BR" sz="2400" b="1" dirty="0"/>
+              <a:t>HIPÓTESES</a:t>
             </a:r>
             <a:r>
               <a:rPr lang="pt-BR" sz="2400" dirty="0"/>
-              <a:t> que serão utilizadas (</a:t>
-            </a:r>
-            <a:r>
-              <a:rPr lang="pt-BR" sz="2400" b="1" dirty="0"/>
-              <a:t>apresentar resumidamente 20 artigos no mínimo</a:t>
-            </a:r>
-            <a:r>
-              <a:rPr lang="pt-BR" sz="2400" dirty="0"/>
-              <a:t>)?</a:t>
+              <a:t> da pesquisa (se necessário)?</a:t>
             </a:r>
           </a:p>
         </p:txBody>
@@ -6463,7 +7176,7 @@
           <p:cNvPr id="4" name="CaixaDeTexto 3">
             <a:extLst>
               <a:ext uri="{FF2B5EF4-FFF2-40B4-BE49-F238E27FC236}">
-                <a16:creationId xmlns:a16="http://schemas.microsoft.com/office/drawing/2014/main" id="{E4CC8CAB-3F4C-409C-8745-BB5BD7AF0FCB}"/>
+                <a16:creationId xmlns:a16="http://schemas.microsoft.com/office/drawing/2014/main" id="{201C3BF0-3DB6-45FE-ABB3-0E8206DE61D9}"/>
               </a:ext>
             </a:extLst>
           </p:cNvPr>
@@ -6472,7 +7185,7 @@
         </p:nvSpPr>
         <p:spPr>
           <a:xfrm>
-            <a:off x="176644" y="2699134"/>
+            <a:off x="176644" y="2016087"/>
             <a:ext cx="11919876" cy="430887"/>
           </a:xfrm>
           <a:prstGeom prst="rect">
@@ -6499,7 +7212,7 @@
     </p:spTree>
     <p:extLst>
       <p:ext uri="{BB962C8B-B14F-4D97-AF65-F5344CB8AC3E}">
-        <p14:creationId xmlns:p14="http://schemas.microsoft.com/office/powerpoint/2010/main" val="1752641579"/>
+        <p14:creationId xmlns:p14="http://schemas.microsoft.com/office/powerpoint/2010/main" val="1702763331"/>
       </p:ext>
     </p:extLst>
   </p:cSld>
@@ -6541,7 +7254,7 @@
         <p:spPr>
           <a:xfrm>
             <a:off x="176644" y="207818"/>
-            <a:ext cx="10058026" cy="954107"/>
+            <a:ext cx="10619886" cy="954107"/>
           </a:xfrm>
           <a:prstGeom prst="rect">
             <a:avLst/>
@@ -6560,41 +7273,17 @@
                   <a:schemeClr val="bg1"/>
                 </a:solidFill>
               </a:rPr>
-              <a:t>2) Base de Dados e Técnicas Estatísticas e/ou de </a:t>
-            </a:r>
-            <a:r>
-              <a:rPr lang="pt-BR" sz="2800" b="1" i="1" dirty="0" err="1">
-                <a:solidFill>
-                  <a:schemeClr val="bg1"/>
-                </a:solidFill>
-              </a:rPr>
-              <a:t>Machine</a:t>
-            </a:r>
-            <a:r>
-              <a:rPr lang="pt-BR" sz="2800" b="1" i="1" dirty="0">
-                <a:solidFill>
-                  <a:schemeClr val="bg1"/>
-                </a:solidFill>
-              </a:rPr>
-              <a:t> Learning</a:t>
-            </a:r>
-            <a:r>
-              <a:rPr lang="pt-BR" sz="2800" b="1" dirty="0">
-                <a:solidFill>
-                  <a:schemeClr val="bg1"/>
-                </a:solidFill>
-              </a:rPr>
-              <a:t> do Projeto Analítico</a:t>
+              <a:t>1) Contexto da Pesquisa, Busca de Artigos Científicos, Problema, Hipóteses e Objetivos do Projeto Analítico</a:t>
             </a:r>
           </a:p>
         </p:txBody>
       </p:sp>
       <p:sp>
         <p:nvSpPr>
-          <p:cNvPr id="3" name="Retângulo 2">
+          <p:cNvPr id="5" name="Retângulo 4">
             <a:extLst>
               <a:ext uri="{FF2B5EF4-FFF2-40B4-BE49-F238E27FC236}">
-                <a16:creationId xmlns:a16="http://schemas.microsoft.com/office/drawing/2014/main" id="{174208DE-0C00-40F4-A31A-3BC0AEE1B5CE}"/>
+                <a16:creationId xmlns:a16="http://schemas.microsoft.com/office/drawing/2014/main" id="{C4351BF4-6949-465B-A55A-C8561462CF2E}"/>
               </a:ext>
             </a:extLst>
           </p:cNvPr>
@@ -6604,7 +7293,7 @@
         <p:spPr>
           <a:xfrm>
             <a:off x="176644" y="1355075"/>
-            <a:ext cx="11919876" cy="462114"/>
+            <a:ext cx="11919876" cy="1231556"/>
           </a:xfrm>
           <a:prstGeom prst="rect">
             <a:avLst/>
@@ -6626,19 +7315,27 @@
             </a:pPr>
             <a:r>
               <a:rPr lang="pt-BR" sz="2400" dirty="0"/>
-              <a:t>- Quais variáveis formam a </a:t>
+              <a:t>- Quais artigos científicos já trataram do mesmo contexto e/ou utilizaram as mesmas técnicas estatísticas e/ou de </a:t>
+            </a:r>
+            <a:r>
+              <a:rPr lang="pt-BR" sz="2400" i="1" dirty="0" err="1"/>
+              <a:t>machine</a:t>
+            </a:r>
+            <a:r>
+              <a:rPr lang="pt-BR" sz="2400" i="1" dirty="0"/>
+              <a:t> </a:t>
+            </a:r>
+            <a:r>
+              <a:rPr lang="pt-BR" sz="2400" i="1" dirty="0" err="1"/>
+              <a:t>learning</a:t>
+            </a:r>
+            <a:r>
+              <a:rPr lang="pt-BR" sz="2400" dirty="0"/>
+              <a:t> que serão utilizadas (</a:t>
             </a:r>
             <a:r>
               <a:rPr lang="pt-BR" sz="2400" b="1" dirty="0"/>
-              <a:t>BASE DE DADOS</a:t>
-            </a:r>
-            <a:r>
-              <a:rPr lang="pt-BR" sz="2400" dirty="0"/>
-              <a:t> (</a:t>
-            </a:r>
-            <a:r>
-              <a:rPr lang="pt-BR" sz="2400" b="1" dirty="0"/>
-              <a:t>mostrar a base de dados completa</a:t>
+              <a:t>apresentar resumidamente 20 artigos no mínimo</a:t>
             </a:r>
             <a:r>
               <a:rPr lang="pt-BR" sz="2400" dirty="0"/>
@@ -6652,7 +7349,7 @@
           <p:cNvPr id="4" name="CaixaDeTexto 3">
             <a:extLst>
               <a:ext uri="{FF2B5EF4-FFF2-40B4-BE49-F238E27FC236}">
-                <a16:creationId xmlns:a16="http://schemas.microsoft.com/office/drawing/2014/main" id="{F523F8A5-43AB-4AB2-BB4F-7F4A30E4A077}"/>
+                <a16:creationId xmlns:a16="http://schemas.microsoft.com/office/drawing/2014/main" id="{E4CC8CAB-3F4C-409C-8745-BB5BD7AF0FCB}"/>
               </a:ext>
             </a:extLst>
           </p:cNvPr>
@@ -6661,7 +7358,7 @@
         </p:nvSpPr>
         <p:spPr>
           <a:xfrm>
-            <a:off x="176644" y="2016087"/>
+            <a:off x="176644" y="2699134"/>
             <a:ext cx="11919876" cy="430887"/>
           </a:xfrm>
           <a:prstGeom prst="rect">
@@ -6688,7 +7385,7 @@
     </p:spTree>
     <p:extLst>
       <p:ext uri="{BB962C8B-B14F-4D97-AF65-F5344CB8AC3E}">
-        <p14:creationId xmlns:p14="http://schemas.microsoft.com/office/powerpoint/2010/main" val="599003997"/>
+        <p14:creationId xmlns:p14="http://schemas.microsoft.com/office/powerpoint/2010/main" val="1752641579"/>
       </p:ext>
     </p:extLst>
   </p:cSld>
@@ -6815,23 +7512,23 @@
             </a:pPr>
             <a:r>
               <a:rPr lang="pt-BR" sz="2400" dirty="0"/>
-              <a:t>- Quais variáveis foram concebidas após aplicação de </a:t>
-            </a:r>
-            <a:r>
-              <a:rPr lang="pt-BR" sz="2400" i="1" dirty="0" err="1"/>
-              <a:t>feature</a:t>
-            </a:r>
-            <a:r>
-              <a:rPr lang="pt-BR" sz="2400" i="1" dirty="0"/>
-              <a:t> </a:t>
-            </a:r>
-            <a:r>
-              <a:rPr lang="pt-BR" sz="2400" i="1" dirty="0" err="1"/>
-              <a:t>engineering</a:t>
+              <a:t>- Quais variáveis formam a </a:t>
+            </a:r>
+            <a:r>
+              <a:rPr lang="pt-BR" sz="2400" b="1" dirty="0"/>
+              <a:t>BASE DE DADOS</a:t>
             </a:r>
             <a:r>
               <a:rPr lang="pt-BR" sz="2400" dirty="0"/>
-              <a:t>?</a:t>
+              <a:t> (</a:t>
+            </a:r>
+            <a:r>
+              <a:rPr lang="pt-BR" sz="2400" b="1" dirty="0"/>
+              <a:t>mostrar a base de dados completa</a:t>
+            </a:r>
+            <a:r>
+              <a:rPr lang="pt-BR" sz="2400" dirty="0"/>
+              <a:t>)?</a:t>
             </a:r>
           </a:p>
         </p:txBody>
@@ -6841,7 +7538,7 @@
           <p:cNvPr id="4" name="CaixaDeTexto 3">
             <a:extLst>
               <a:ext uri="{FF2B5EF4-FFF2-40B4-BE49-F238E27FC236}">
-                <a16:creationId xmlns:a16="http://schemas.microsoft.com/office/drawing/2014/main" id="{C7463C38-0C64-417D-97DB-85F9C1B86AF4}"/>
+                <a16:creationId xmlns:a16="http://schemas.microsoft.com/office/drawing/2014/main" id="{F523F8A5-43AB-4AB2-BB4F-7F4A30E4A077}"/>
               </a:ext>
             </a:extLst>
           </p:cNvPr>
@@ -6877,7 +7574,7 @@
     </p:spTree>
     <p:extLst>
       <p:ext uri="{BB962C8B-B14F-4D97-AF65-F5344CB8AC3E}">
-        <p14:creationId xmlns:p14="http://schemas.microsoft.com/office/powerpoint/2010/main" val="1588210080"/>
+        <p14:creationId xmlns:p14="http://schemas.microsoft.com/office/powerpoint/2010/main" val="599003997"/>
       </p:ext>
     </p:extLst>
   </p:cSld>

</xml_diff>

<commit_message>
Adding the question and objectives
</commit_message>
<xml_diff>
--- a/presentation/FGV-MBA - Monografia - Detecção de Máscara Facial.pptx
+++ b/presentation/FGV-MBA - Monografia - Detecção de Máscara Facial.pptx
@@ -131,10 +131,10 @@
   </p:defaultTextStyle>
   <p:extLst>
     <p:ext uri="{EFAFB233-063F-42B5-8137-9DF3F51BA10A}">
-      <p15:sldGuideLst xmlns:p15="http://schemas.microsoft.com/office/powerpoint/2012/main"/>
+      <p15:sldGuideLst xmlns="" xmlns:p15="http://schemas.microsoft.com/office/powerpoint/2012/main"/>
     </p:ext>
     <p:ext uri="{2D200454-40CA-4A62-9FC3-DE9A4176ACB9}">
-      <p15:notesGuideLst xmlns:p15="http://schemas.microsoft.com/office/powerpoint/2012/main"/>
+      <p15:notesGuideLst xmlns="" xmlns:p15="http://schemas.microsoft.com/office/powerpoint/2012/main"/>
     </p:ext>
   </p:extLst>
 </p:presentation>
@@ -655,7 +655,7 @@
           <p:cNvPr id="2" name="Espaço Reservado para Cabeçalho 1">
             <a:extLst>
               <a:ext uri="{FF2B5EF4-FFF2-40B4-BE49-F238E27FC236}">
-                <a16:creationId xmlns:a16="http://schemas.microsoft.com/office/drawing/2014/main" id="{E162C314-7D57-441B-B744-E28993A863F5}"/>
+                <a16:creationId xmlns="" xmlns:a16="http://schemas.microsoft.com/office/drawing/2014/main" id="{E162C314-7D57-441B-B744-E28993A863F5}"/>
               </a:ext>
             </a:extLst>
           </p:cNvPr>
@@ -692,7 +692,7 @@
           <p:cNvPr id="3" name="Espaço Reservado para Data 2">
             <a:extLst>
               <a:ext uri="{FF2B5EF4-FFF2-40B4-BE49-F238E27FC236}">
-                <a16:creationId xmlns:a16="http://schemas.microsoft.com/office/drawing/2014/main" id="{C2801EC7-4137-4F0C-9FE9-6CCD8E42D476}"/>
+                <a16:creationId xmlns="" xmlns:a16="http://schemas.microsoft.com/office/drawing/2014/main" id="{C2801EC7-4137-4F0C-9FE9-6CCD8E42D476}"/>
               </a:ext>
             </a:extLst>
           </p:cNvPr>
@@ -722,7 +722,8 @@
           <a:p>
             <a:fld id="{B26FF4F9-2FBB-4F7A-9697-05FA74F11F3B}" type="datetimeFigureOut">
               <a:rPr lang="pt-BR" smtClean="0"/>
-              <a:t>24/05/2020</a:t>
+              <a:pPr/>
+              <a:t>25/05/2020</a:t>
             </a:fld>
             <a:endParaRPr lang="pt-BR"/>
           </a:p>
@@ -733,7 +734,7 @@
           <p:cNvPr id="4" name="Espaço Reservado para Rodapé 3">
             <a:extLst>
               <a:ext uri="{FF2B5EF4-FFF2-40B4-BE49-F238E27FC236}">
-                <a16:creationId xmlns:a16="http://schemas.microsoft.com/office/drawing/2014/main" id="{08AC7BC5-A4B9-4BAF-8599-3FBF718ACEDF}"/>
+                <a16:creationId xmlns="" xmlns:a16="http://schemas.microsoft.com/office/drawing/2014/main" id="{08AC7BC5-A4B9-4BAF-8599-3FBF718ACEDF}"/>
               </a:ext>
             </a:extLst>
           </p:cNvPr>
@@ -770,7 +771,7 @@
           <p:cNvPr id="5" name="Espaço Reservado para Número de Slide 4">
             <a:extLst>
               <a:ext uri="{FF2B5EF4-FFF2-40B4-BE49-F238E27FC236}">
-                <a16:creationId xmlns:a16="http://schemas.microsoft.com/office/drawing/2014/main" id="{1B9FE065-BF0E-4247-835C-E4DA37C97E0F}"/>
+                <a16:creationId xmlns="" xmlns:a16="http://schemas.microsoft.com/office/drawing/2014/main" id="{1B9FE065-BF0E-4247-835C-E4DA37C97E0F}"/>
               </a:ext>
             </a:extLst>
           </p:cNvPr>
@@ -800,7 +801,8 @@
           <a:p>
             <a:fld id="{966B0CA9-991F-48D6-8F14-8287C17CA522}" type="slidenum">
               <a:rPr lang="pt-BR" smtClean="0"/>
-              <a:t>‹#›</a:t>
+              <a:pPr/>
+              <a:t>‹nº›</a:t>
             </a:fld>
             <a:endParaRPr lang="pt-BR"/>
           </a:p>
@@ -809,7 +811,7 @@
     </p:spTree>
     <p:extLst>
       <p:ext uri="{BB962C8B-B14F-4D97-AF65-F5344CB8AC3E}">
-        <p14:creationId xmlns:p14="http://schemas.microsoft.com/office/powerpoint/2010/main" val="3668408037"/>
+        <p14:creationId xmlns="" xmlns:p14="http://schemas.microsoft.com/office/powerpoint/2010/main" val="3668408037"/>
       </p:ext>
     </p:extLst>
   </p:cSld>
@@ -899,7 +901,8 @@
           <a:p>
             <a:fld id="{1820D135-1270-41BD-8A14-B5B3DA62A4B5}" type="datetimeFigureOut">
               <a:rPr lang="pt-BR" smtClean="0"/>
-              <a:t>24/05/2020</a:t>
+              <a:pPr/>
+              <a:t>25/05/2020</a:t>
             </a:fld>
             <a:endParaRPr lang="pt-BR"/>
           </a:p>
@@ -1057,7 +1060,8 @@
           <a:p>
             <a:fld id="{A9C31BF8-0EC7-40CB-89AF-7A4EB90D2C8E}" type="slidenum">
               <a:rPr lang="pt-BR" smtClean="0"/>
-              <a:t>‹#›</a:t>
+              <a:pPr/>
+              <a:t>‹nº›</a:t>
             </a:fld>
             <a:endParaRPr lang="pt-BR"/>
           </a:p>
@@ -1066,7 +1070,7 @@
     </p:spTree>
     <p:extLst>
       <p:ext uri="{BB962C8B-B14F-4D97-AF65-F5344CB8AC3E}">
-        <p14:creationId xmlns:p14="http://schemas.microsoft.com/office/powerpoint/2010/main" val="138149862"/>
+        <p14:creationId xmlns="" xmlns:p14="http://schemas.microsoft.com/office/powerpoint/2010/main" val="138149862"/>
       </p:ext>
     </p:extLst>
   </p:cSld>
@@ -1186,7 +1190,7 @@
     </p:spTree>
     <p:extLst>
       <p:ext uri="{BB962C8B-B14F-4D97-AF65-F5344CB8AC3E}">
-        <p14:creationId xmlns:p14="http://schemas.microsoft.com/office/powerpoint/2010/main" val="670603413"/>
+        <p14:creationId xmlns="" xmlns:p14="http://schemas.microsoft.com/office/powerpoint/2010/main" val="670603413"/>
       </p:ext>
     </p:extLst>
   </p:cSld>
@@ -1216,7 +1220,7 @@
     </p:spTree>
     <p:extLst>
       <p:ext uri="{BB962C8B-B14F-4D97-AF65-F5344CB8AC3E}">
-        <p14:creationId xmlns:p14="http://schemas.microsoft.com/office/powerpoint/2010/main" val="3704000944"/>
+        <p14:creationId xmlns="" xmlns:p14="http://schemas.microsoft.com/office/powerpoint/2010/main" val="3704000944"/>
       </p:ext>
     </p:extLst>
   </p:cSld>
@@ -1246,7 +1250,7 @@
     </p:spTree>
     <p:extLst>
       <p:ext uri="{BB962C8B-B14F-4D97-AF65-F5344CB8AC3E}">
-        <p14:creationId xmlns:p14="http://schemas.microsoft.com/office/powerpoint/2010/main" val="1254645961"/>
+        <p14:creationId xmlns="" xmlns:p14="http://schemas.microsoft.com/office/powerpoint/2010/main" val="1254645961"/>
       </p:ext>
     </p:extLst>
   </p:cSld>
@@ -1283,7 +1287,7 @@
           <p:cNvPr id="2" name="Rectangle 1">
             <a:extLst>
               <a:ext uri="{FF2B5EF4-FFF2-40B4-BE49-F238E27FC236}">
-                <a16:creationId xmlns:a16="http://schemas.microsoft.com/office/drawing/2014/main" id="{64EB0046-E308-4E16-A675-E3D297191010}"/>
+                <a16:creationId xmlns="" xmlns:a16="http://schemas.microsoft.com/office/drawing/2014/main" id="{64EB0046-E308-4E16-A675-E3D297191010}"/>
               </a:ext>
             </a:extLst>
           </p:cNvPr>
@@ -1335,7 +1339,7 @@
           <p:cNvPr id="8" name="Retângulo 7">
             <a:extLst>
               <a:ext uri="{FF2B5EF4-FFF2-40B4-BE49-F238E27FC236}">
-                <a16:creationId xmlns:a16="http://schemas.microsoft.com/office/drawing/2014/main" id="{A828098A-D6AF-47D7-9E8B-AC289B93477A}"/>
+                <a16:creationId xmlns="" xmlns:a16="http://schemas.microsoft.com/office/drawing/2014/main" id="{A828098A-D6AF-47D7-9E8B-AC289B93477A}"/>
               </a:ext>
             </a:extLst>
           </p:cNvPr>
@@ -1407,7 +1411,7 @@
           <p:cNvPr id="9" name="Retângulo 8">
             <a:extLst>
               <a:ext uri="{FF2B5EF4-FFF2-40B4-BE49-F238E27FC236}">
-                <a16:creationId xmlns:a16="http://schemas.microsoft.com/office/drawing/2014/main" id="{86DC847E-2163-4663-8A43-44176F3FA653}"/>
+                <a16:creationId xmlns="" xmlns:a16="http://schemas.microsoft.com/office/drawing/2014/main" id="{86DC847E-2163-4663-8A43-44176F3FA653}"/>
               </a:ext>
             </a:extLst>
           </p:cNvPr>
@@ -1479,7 +1483,7 @@
           <p:cNvPr id="10" name="Retângulo 9">
             <a:extLst>
               <a:ext uri="{FF2B5EF4-FFF2-40B4-BE49-F238E27FC236}">
-                <a16:creationId xmlns:a16="http://schemas.microsoft.com/office/drawing/2014/main" id="{3DDD2990-640C-48C0-9A30-F34F09FDB932}"/>
+                <a16:creationId xmlns="" xmlns:a16="http://schemas.microsoft.com/office/drawing/2014/main" id="{3DDD2990-640C-48C0-9A30-F34F09FDB932}"/>
               </a:ext>
             </a:extLst>
           </p:cNvPr>
@@ -1551,7 +1555,7 @@
           <p:cNvPr id="11" name="Retângulo 10">
             <a:extLst>
               <a:ext uri="{FF2B5EF4-FFF2-40B4-BE49-F238E27FC236}">
-                <a16:creationId xmlns:a16="http://schemas.microsoft.com/office/drawing/2014/main" id="{7E10A596-828F-4E16-B1BA-A98D5F25D8A2}"/>
+                <a16:creationId xmlns="" xmlns:a16="http://schemas.microsoft.com/office/drawing/2014/main" id="{7E10A596-828F-4E16-B1BA-A98D5F25D8A2}"/>
               </a:ext>
             </a:extLst>
           </p:cNvPr>
@@ -1639,7 +1643,7 @@
           <p:cNvPr id="12" name="Retângulo 11">
             <a:extLst>
               <a:ext uri="{FF2B5EF4-FFF2-40B4-BE49-F238E27FC236}">
-                <a16:creationId xmlns:a16="http://schemas.microsoft.com/office/drawing/2014/main" id="{12B7208E-31A2-41A8-A5AB-47F269367C24}"/>
+                <a16:creationId xmlns="" xmlns:a16="http://schemas.microsoft.com/office/drawing/2014/main" id="{12B7208E-31A2-41A8-A5AB-47F269367C24}"/>
               </a:ext>
             </a:extLst>
           </p:cNvPr>
@@ -1711,7 +1715,7 @@
           <p:cNvPr id="13" name="Retângulo 12">
             <a:extLst>
               <a:ext uri="{FF2B5EF4-FFF2-40B4-BE49-F238E27FC236}">
-                <a16:creationId xmlns:a16="http://schemas.microsoft.com/office/drawing/2014/main" id="{6B0C24F7-7F69-4B70-9F40-4AEE70149CD1}"/>
+                <a16:creationId xmlns="" xmlns:a16="http://schemas.microsoft.com/office/drawing/2014/main" id="{6B0C24F7-7F69-4B70-9F40-4AEE70149CD1}"/>
               </a:ext>
             </a:extLst>
           </p:cNvPr>
@@ -1799,7 +1803,7 @@
           <p:cNvPr id="4" name="Picture 3" descr="A close up of a sign&#10;&#10;Description automatically generated">
             <a:extLst>
               <a:ext uri="{FF2B5EF4-FFF2-40B4-BE49-F238E27FC236}">
-                <a16:creationId xmlns:a16="http://schemas.microsoft.com/office/drawing/2014/main" id="{D73F671B-4A3D-42B4-9CAA-AB16E1C8C881}"/>
+                <a16:creationId xmlns="" xmlns:a16="http://schemas.microsoft.com/office/drawing/2014/main" id="{D73F671B-4A3D-42B4-9CAA-AB16E1C8C881}"/>
               </a:ext>
             </a:extLst>
           </p:cNvPr>
@@ -1809,10 +1813,10 @@
           <p:nvPr userDrawn="1"/>
         </p:nvPicPr>
         <p:blipFill>
-          <a:blip r:embed="rId3">
+          <a:blip r:embed="rId3" cstate="print">
             <a:extLst>
               <a:ext uri="{28A0092B-C50C-407E-A947-70E740481C1C}">
-                <a14:useLocalDpi xmlns:a14="http://schemas.microsoft.com/office/drawing/2010/main" val="0"/>
+                <a14:useLocalDpi xmlns="" xmlns:a14="http://schemas.microsoft.com/office/drawing/2010/main" val="0"/>
               </a:ext>
             </a:extLst>
           </a:blip>
@@ -1833,7 +1837,7 @@
     </p:spTree>
     <p:extLst>
       <p:ext uri="{BB962C8B-B14F-4D97-AF65-F5344CB8AC3E}">
-        <p14:creationId xmlns:p14="http://schemas.microsoft.com/office/powerpoint/2010/main" val="2748047865"/>
+        <p14:creationId xmlns="" xmlns:p14="http://schemas.microsoft.com/office/powerpoint/2010/main" val="2748047865"/>
       </p:ext>
     </p:extLst>
   </p:cSld>
@@ -2151,7 +2155,7 @@
           <p:cNvPr id="8" name="Retângulo 7">
             <a:extLst>
               <a:ext uri="{FF2B5EF4-FFF2-40B4-BE49-F238E27FC236}">
-                <a16:creationId xmlns:a16="http://schemas.microsoft.com/office/drawing/2014/main" id="{A828098A-D6AF-47D7-9E8B-AC289B93477A}"/>
+                <a16:creationId xmlns="" xmlns:a16="http://schemas.microsoft.com/office/drawing/2014/main" id="{A828098A-D6AF-47D7-9E8B-AC289B93477A}"/>
               </a:ext>
             </a:extLst>
           </p:cNvPr>
@@ -2223,7 +2227,7 @@
           <p:cNvPr id="9" name="Retângulo 8">
             <a:extLst>
               <a:ext uri="{FF2B5EF4-FFF2-40B4-BE49-F238E27FC236}">
-                <a16:creationId xmlns:a16="http://schemas.microsoft.com/office/drawing/2014/main" id="{86DC847E-2163-4663-8A43-44176F3FA653}"/>
+                <a16:creationId xmlns="" xmlns:a16="http://schemas.microsoft.com/office/drawing/2014/main" id="{86DC847E-2163-4663-8A43-44176F3FA653}"/>
               </a:ext>
             </a:extLst>
           </p:cNvPr>
@@ -2295,7 +2299,7 @@
           <p:cNvPr id="10" name="Retângulo 9">
             <a:extLst>
               <a:ext uri="{FF2B5EF4-FFF2-40B4-BE49-F238E27FC236}">
-                <a16:creationId xmlns:a16="http://schemas.microsoft.com/office/drawing/2014/main" id="{3DDD2990-640C-48C0-9A30-F34F09FDB932}"/>
+                <a16:creationId xmlns="" xmlns:a16="http://schemas.microsoft.com/office/drawing/2014/main" id="{3DDD2990-640C-48C0-9A30-F34F09FDB932}"/>
               </a:ext>
             </a:extLst>
           </p:cNvPr>
@@ -2367,7 +2371,7 @@
           <p:cNvPr id="11" name="Retângulo 10">
             <a:extLst>
               <a:ext uri="{FF2B5EF4-FFF2-40B4-BE49-F238E27FC236}">
-                <a16:creationId xmlns:a16="http://schemas.microsoft.com/office/drawing/2014/main" id="{7E10A596-828F-4E16-B1BA-A98D5F25D8A2}"/>
+                <a16:creationId xmlns="" xmlns:a16="http://schemas.microsoft.com/office/drawing/2014/main" id="{7E10A596-828F-4E16-B1BA-A98D5F25D8A2}"/>
               </a:ext>
             </a:extLst>
           </p:cNvPr>
@@ -2455,7 +2459,7 @@
           <p:cNvPr id="12" name="Retângulo 11">
             <a:extLst>
               <a:ext uri="{FF2B5EF4-FFF2-40B4-BE49-F238E27FC236}">
-                <a16:creationId xmlns:a16="http://schemas.microsoft.com/office/drawing/2014/main" id="{12B7208E-31A2-41A8-A5AB-47F269367C24}"/>
+                <a16:creationId xmlns="" xmlns:a16="http://schemas.microsoft.com/office/drawing/2014/main" id="{12B7208E-31A2-41A8-A5AB-47F269367C24}"/>
               </a:ext>
             </a:extLst>
           </p:cNvPr>
@@ -2527,7 +2531,7 @@
           <p:cNvPr id="13" name="Retângulo 12">
             <a:extLst>
               <a:ext uri="{FF2B5EF4-FFF2-40B4-BE49-F238E27FC236}">
-                <a16:creationId xmlns:a16="http://schemas.microsoft.com/office/drawing/2014/main" id="{6B0C24F7-7F69-4B70-9F40-4AEE70149CD1}"/>
+                <a16:creationId xmlns="" xmlns:a16="http://schemas.microsoft.com/office/drawing/2014/main" id="{6B0C24F7-7F69-4B70-9F40-4AEE70149CD1}"/>
               </a:ext>
             </a:extLst>
           </p:cNvPr>
@@ -2615,7 +2619,7 @@
           <p:cNvPr id="2" name="Retângulo 1">
             <a:extLst>
               <a:ext uri="{FF2B5EF4-FFF2-40B4-BE49-F238E27FC236}">
-                <a16:creationId xmlns:a16="http://schemas.microsoft.com/office/drawing/2014/main" id="{5334EC60-A39B-4E05-8C93-2BCD38586D66}"/>
+                <a16:creationId xmlns="" xmlns:a16="http://schemas.microsoft.com/office/drawing/2014/main" id="{5334EC60-A39B-4E05-8C93-2BCD38586D66}"/>
               </a:ext>
             </a:extLst>
           </p:cNvPr>
@@ -2667,7 +2671,7 @@
           <p:cNvPr id="17" name="Picture 16" descr="A close up of a sign&#10;&#10;Description automatically generated">
             <a:extLst>
               <a:ext uri="{FF2B5EF4-FFF2-40B4-BE49-F238E27FC236}">
-                <a16:creationId xmlns:a16="http://schemas.microsoft.com/office/drawing/2014/main" id="{26D5B9F7-D9B8-4552-A8E2-279C065ACFE9}"/>
+                <a16:creationId xmlns="" xmlns:a16="http://schemas.microsoft.com/office/drawing/2014/main" id="{26D5B9F7-D9B8-4552-A8E2-279C065ACFE9}"/>
               </a:ext>
             </a:extLst>
           </p:cNvPr>
@@ -2677,10 +2681,10 @@
           <p:nvPr userDrawn="1"/>
         </p:nvPicPr>
         <p:blipFill>
-          <a:blip r:embed="rId3">
+          <a:blip r:embed="rId3" cstate="print">
             <a:extLst>
               <a:ext uri="{28A0092B-C50C-407E-A947-70E740481C1C}">
-                <a14:useLocalDpi xmlns:a14="http://schemas.microsoft.com/office/drawing/2010/main" val="0"/>
+                <a14:useLocalDpi xmlns="" xmlns:a14="http://schemas.microsoft.com/office/drawing/2010/main" val="0"/>
               </a:ext>
             </a:extLst>
           </a:blip>
@@ -2701,7 +2705,7 @@
     </p:spTree>
     <p:extLst>
       <p:ext uri="{BB962C8B-B14F-4D97-AF65-F5344CB8AC3E}">
-        <p14:creationId xmlns:p14="http://schemas.microsoft.com/office/powerpoint/2010/main" val="1038931235"/>
+        <p14:creationId xmlns="" xmlns:p14="http://schemas.microsoft.com/office/powerpoint/2010/main" val="1038931235"/>
       </p:ext>
     </p:extLst>
   </p:cSld>
@@ -3019,7 +3023,7 @@
           <p:cNvPr id="8" name="Retângulo 7">
             <a:extLst>
               <a:ext uri="{FF2B5EF4-FFF2-40B4-BE49-F238E27FC236}">
-                <a16:creationId xmlns:a16="http://schemas.microsoft.com/office/drawing/2014/main" id="{A828098A-D6AF-47D7-9E8B-AC289B93477A}"/>
+                <a16:creationId xmlns="" xmlns:a16="http://schemas.microsoft.com/office/drawing/2014/main" id="{A828098A-D6AF-47D7-9E8B-AC289B93477A}"/>
               </a:ext>
             </a:extLst>
           </p:cNvPr>
@@ -3091,7 +3095,7 @@
           <p:cNvPr id="9" name="Retângulo 8">
             <a:extLst>
               <a:ext uri="{FF2B5EF4-FFF2-40B4-BE49-F238E27FC236}">
-                <a16:creationId xmlns:a16="http://schemas.microsoft.com/office/drawing/2014/main" id="{86DC847E-2163-4663-8A43-44176F3FA653}"/>
+                <a16:creationId xmlns="" xmlns:a16="http://schemas.microsoft.com/office/drawing/2014/main" id="{86DC847E-2163-4663-8A43-44176F3FA653}"/>
               </a:ext>
             </a:extLst>
           </p:cNvPr>
@@ -3163,7 +3167,7 @@
           <p:cNvPr id="10" name="Retângulo 9">
             <a:extLst>
               <a:ext uri="{FF2B5EF4-FFF2-40B4-BE49-F238E27FC236}">
-                <a16:creationId xmlns:a16="http://schemas.microsoft.com/office/drawing/2014/main" id="{3DDD2990-640C-48C0-9A30-F34F09FDB932}"/>
+                <a16:creationId xmlns="" xmlns:a16="http://schemas.microsoft.com/office/drawing/2014/main" id="{3DDD2990-640C-48C0-9A30-F34F09FDB932}"/>
               </a:ext>
             </a:extLst>
           </p:cNvPr>
@@ -3235,7 +3239,7 @@
           <p:cNvPr id="11" name="Retângulo 10">
             <a:extLst>
               <a:ext uri="{FF2B5EF4-FFF2-40B4-BE49-F238E27FC236}">
-                <a16:creationId xmlns:a16="http://schemas.microsoft.com/office/drawing/2014/main" id="{7E10A596-828F-4E16-B1BA-A98D5F25D8A2}"/>
+                <a16:creationId xmlns="" xmlns:a16="http://schemas.microsoft.com/office/drawing/2014/main" id="{7E10A596-828F-4E16-B1BA-A98D5F25D8A2}"/>
               </a:ext>
             </a:extLst>
           </p:cNvPr>
@@ -3323,7 +3327,7 @@
           <p:cNvPr id="12" name="Retângulo 11">
             <a:extLst>
               <a:ext uri="{FF2B5EF4-FFF2-40B4-BE49-F238E27FC236}">
-                <a16:creationId xmlns:a16="http://schemas.microsoft.com/office/drawing/2014/main" id="{12B7208E-31A2-41A8-A5AB-47F269367C24}"/>
+                <a16:creationId xmlns="" xmlns:a16="http://schemas.microsoft.com/office/drawing/2014/main" id="{12B7208E-31A2-41A8-A5AB-47F269367C24}"/>
               </a:ext>
             </a:extLst>
           </p:cNvPr>
@@ -3395,7 +3399,7 @@
           <p:cNvPr id="13" name="Retângulo 12">
             <a:extLst>
               <a:ext uri="{FF2B5EF4-FFF2-40B4-BE49-F238E27FC236}">
-                <a16:creationId xmlns:a16="http://schemas.microsoft.com/office/drawing/2014/main" id="{6B0C24F7-7F69-4B70-9F40-4AEE70149CD1}"/>
+                <a16:creationId xmlns="" xmlns:a16="http://schemas.microsoft.com/office/drawing/2014/main" id="{6B0C24F7-7F69-4B70-9F40-4AEE70149CD1}"/>
               </a:ext>
             </a:extLst>
           </p:cNvPr>
@@ -3483,7 +3487,7 @@
           <p:cNvPr id="14" name="Retângulo 1">
             <a:extLst>
               <a:ext uri="{FF2B5EF4-FFF2-40B4-BE49-F238E27FC236}">
-                <a16:creationId xmlns:a16="http://schemas.microsoft.com/office/drawing/2014/main" id="{57F11C7B-FB85-4F49-A153-80D627D395DD}"/>
+                <a16:creationId xmlns="" xmlns:a16="http://schemas.microsoft.com/office/drawing/2014/main" id="{57F11C7B-FB85-4F49-A153-80D627D395DD}"/>
               </a:ext>
             </a:extLst>
           </p:cNvPr>
@@ -3533,7 +3537,7 @@
     </p:spTree>
     <p:extLst>
       <p:ext uri="{BB962C8B-B14F-4D97-AF65-F5344CB8AC3E}">
-        <p14:creationId xmlns:p14="http://schemas.microsoft.com/office/powerpoint/2010/main" val="1143214059"/>
+        <p14:creationId xmlns="" xmlns:p14="http://schemas.microsoft.com/office/powerpoint/2010/main" val="1143214059"/>
       </p:ext>
     </p:extLst>
   </p:cSld>
@@ -3846,7 +3850,7 @@
           <p:cNvPr id="2" name="Retângulo 1">
             <a:extLst>
               <a:ext uri="{FF2B5EF4-FFF2-40B4-BE49-F238E27FC236}">
-                <a16:creationId xmlns:a16="http://schemas.microsoft.com/office/drawing/2014/main" id="{70F687BA-32A2-41BC-B72A-F28209A7F473}"/>
+                <a16:creationId xmlns="" xmlns:a16="http://schemas.microsoft.com/office/drawing/2014/main" id="{70F687BA-32A2-41BC-B72A-F28209A7F473}"/>
               </a:ext>
             </a:extLst>
           </p:cNvPr>
@@ -3911,7 +3915,7 @@
           <p:cNvPr id="3" name="Retângulo 2">
             <a:extLst>
               <a:ext uri="{FF2B5EF4-FFF2-40B4-BE49-F238E27FC236}">
-                <a16:creationId xmlns:a16="http://schemas.microsoft.com/office/drawing/2014/main" id="{94B768D7-96B0-41DF-9630-0D308384D261}"/>
+                <a16:creationId xmlns="" xmlns:a16="http://schemas.microsoft.com/office/drawing/2014/main" id="{94B768D7-96B0-41DF-9630-0D308384D261}"/>
               </a:ext>
             </a:extLst>
           </p:cNvPr>
@@ -4000,7 +4004,7 @@
                 <a:hlinkClick r:id="rId2">
                   <a:extLst>
                     <a:ext uri="{A12FA001-AC4F-418D-AE19-62706E023703}">
-                      <ahyp:hlinkClr xmlns:ahyp="http://schemas.microsoft.com/office/drawing/2018/hyperlinkcolor" val="tx"/>
+                      <ahyp:hlinkClr xmlns="" xmlns:ahyp="http://schemas.microsoft.com/office/drawing/2018/hyperlinkcolor" val="tx"/>
                     </a:ext>
                   </a:extLst>
                 </a:hlinkClick>
@@ -4070,7 +4074,7 @@
                 <a:hlinkClick r:id="rId3">
                   <a:extLst>
                     <a:ext uri="{A12FA001-AC4F-418D-AE19-62706E023703}">
-                      <ahyp:hlinkClr xmlns:ahyp="http://schemas.microsoft.com/office/drawing/2018/hyperlinkcolor" val="tx"/>
+                      <ahyp:hlinkClr xmlns="" xmlns:ahyp="http://schemas.microsoft.com/office/drawing/2018/hyperlinkcolor" val="tx"/>
                     </a:ext>
                   </a:extLst>
                 </a:hlinkClick>
@@ -4122,7 +4126,7 @@
                 <a:hlinkClick r:id="rId4">
                   <a:extLst>
                     <a:ext uri="{A12FA001-AC4F-418D-AE19-62706E023703}">
-                      <ahyp:hlinkClr xmlns:ahyp="http://schemas.microsoft.com/office/drawing/2018/hyperlinkcolor" val="tx"/>
+                      <ahyp:hlinkClr xmlns="" xmlns:ahyp="http://schemas.microsoft.com/office/drawing/2018/hyperlinkcolor" val="tx"/>
                     </a:ext>
                   </a:extLst>
                 </a:hlinkClick>
@@ -4183,7 +4187,7 @@
                 <a:hlinkClick r:id="rId5">
                   <a:extLst>
                     <a:ext uri="{A12FA001-AC4F-418D-AE19-62706E023703}">
-                      <ahyp:hlinkClr xmlns:ahyp="http://schemas.microsoft.com/office/drawing/2018/hyperlinkcolor" val="tx"/>
+                      <ahyp:hlinkClr xmlns="" xmlns:ahyp="http://schemas.microsoft.com/office/drawing/2018/hyperlinkcolor" val="tx"/>
                     </a:ext>
                   </a:extLst>
                 </a:hlinkClick>
@@ -4254,7 +4258,7 @@
                 <a:hlinkClick r:id="rId6">
                   <a:extLst>
                     <a:ext uri="{A12FA001-AC4F-418D-AE19-62706E023703}">
-                      <ahyp:hlinkClr xmlns:ahyp="http://schemas.microsoft.com/office/drawing/2018/hyperlinkcolor" val="tx"/>
+                      <ahyp:hlinkClr xmlns="" xmlns:ahyp="http://schemas.microsoft.com/office/drawing/2018/hyperlinkcolor" val="tx"/>
                     </a:ext>
                   </a:extLst>
                 </a:hlinkClick>
@@ -4269,6 +4273,19 @@
                 <a:latin typeface="Calibri (Body)"/>
               </a:rPr>
               <a:t>)</a:t>
+            </a:r>
+            <a:r>
+              <a:rPr lang="pt-BR" sz="2200" dirty="0">
+                <a:solidFill>
+                  <a:schemeClr val="bg1"/>
+                </a:solidFill>
+                <a:highlight>
+                  <a:srgbClr val="FFFF00"/>
+                </a:highlight>
+                <a:latin typeface="Calibri (Body)"/>
+                <a:ea typeface="Times New Roman" panose="02020603050405020304" pitchFamily="18" charset="0"/>
+              </a:rPr>
+              <a:t/>
             </a:r>
             <a:br>
               <a:rPr lang="pt-BR" sz="2200" dirty="0">
@@ -4303,7 +4320,7 @@
     </p:spTree>
     <p:extLst>
       <p:ext uri="{BB962C8B-B14F-4D97-AF65-F5344CB8AC3E}">
-        <p14:creationId xmlns:p14="http://schemas.microsoft.com/office/powerpoint/2010/main" val="679871842"/>
+        <p14:creationId xmlns="" xmlns:p14="http://schemas.microsoft.com/office/powerpoint/2010/main" val="679871842"/>
       </p:ext>
     </p:extLst>
   </p:cSld>
@@ -4335,7 +4352,7 @@
           <p:cNvPr id="2" name="CaixaDeTexto 1">
             <a:extLst>
               <a:ext uri="{FF2B5EF4-FFF2-40B4-BE49-F238E27FC236}">
-                <a16:creationId xmlns:a16="http://schemas.microsoft.com/office/drawing/2014/main" id="{E2289C40-6B36-4906-BF6F-3D1B594D6D57}"/>
+                <a16:creationId xmlns="" xmlns:a16="http://schemas.microsoft.com/office/drawing/2014/main" id="{E2289C40-6B36-4906-BF6F-3D1B594D6D57}"/>
               </a:ext>
             </a:extLst>
           </p:cNvPr>
@@ -4398,7 +4415,7 @@
           <p:cNvPr id="3" name="Retângulo 2">
             <a:extLst>
               <a:ext uri="{FF2B5EF4-FFF2-40B4-BE49-F238E27FC236}">
-                <a16:creationId xmlns:a16="http://schemas.microsoft.com/office/drawing/2014/main" id="{174208DE-0C00-40F4-A31A-3BC0AEE1B5CE}"/>
+                <a16:creationId xmlns="" xmlns:a16="http://schemas.microsoft.com/office/drawing/2014/main" id="{174208DE-0C00-40F4-A31A-3BC0AEE1B5CE}"/>
               </a:ext>
             </a:extLst>
           </p:cNvPr>
@@ -4456,7 +4473,7 @@
           <p:cNvPr id="4" name="CaixaDeTexto 3">
             <a:extLst>
               <a:ext uri="{FF2B5EF4-FFF2-40B4-BE49-F238E27FC236}">
-                <a16:creationId xmlns:a16="http://schemas.microsoft.com/office/drawing/2014/main" id="{C7463C38-0C64-417D-97DB-85F9C1B86AF4}"/>
+                <a16:creationId xmlns="" xmlns:a16="http://schemas.microsoft.com/office/drawing/2014/main" id="{C7463C38-0C64-417D-97DB-85F9C1B86AF4}"/>
               </a:ext>
             </a:extLst>
           </p:cNvPr>
@@ -4492,7 +4509,7 @@
     </p:spTree>
     <p:extLst>
       <p:ext uri="{BB962C8B-B14F-4D97-AF65-F5344CB8AC3E}">
-        <p14:creationId xmlns:p14="http://schemas.microsoft.com/office/powerpoint/2010/main" val="1588210080"/>
+        <p14:creationId xmlns="" xmlns:p14="http://schemas.microsoft.com/office/powerpoint/2010/main" val="1588210080"/>
       </p:ext>
     </p:extLst>
   </p:cSld>
@@ -4524,7 +4541,7 @@
           <p:cNvPr id="2" name="CaixaDeTexto 1">
             <a:extLst>
               <a:ext uri="{FF2B5EF4-FFF2-40B4-BE49-F238E27FC236}">
-                <a16:creationId xmlns:a16="http://schemas.microsoft.com/office/drawing/2014/main" id="{E2289C40-6B36-4906-BF6F-3D1B594D6D57}"/>
+                <a16:creationId xmlns="" xmlns:a16="http://schemas.microsoft.com/office/drawing/2014/main" id="{E2289C40-6B36-4906-BF6F-3D1B594D6D57}"/>
               </a:ext>
             </a:extLst>
           </p:cNvPr>
@@ -4587,7 +4604,7 @@
           <p:cNvPr id="3" name="Retângulo 2">
             <a:extLst>
               <a:ext uri="{FF2B5EF4-FFF2-40B4-BE49-F238E27FC236}">
-                <a16:creationId xmlns:a16="http://schemas.microsoft.com/office/drawing/2014/main" id="{174208DE-0C00-40F4-A31A-3BC0AEE1B5CE}"/>
+                <a16:creationId xmlns="" xmlns:a16="http://schemas.microsoft.com/office/drawing/2014/main" id="{174208DE-0C00-40F4-A31A-3BC0AEE1B5CE}"/>
               </a:ext>
             </a:extLst>
           </p:cNvPr>
@@ -4645,7 +4662,7 @@
           <p:cNvPr id="4" name="CaixaDeTexto 3">
             <a:extLst>
               <a:ext uri="{FF2B5EF4-FFF2-40B4-BE49-F238E27FC236}">
-                <a16:creationId xmlns:a16="http://schemas.microsoft.com/office/drawing/2014/main" id="{2CEABB78-1981-4542-9477-F6F9986CDBB1}"/>
+                <a16:creationId xmlns="" xmlns:a16="http://schemas.microsoft.com/office/drawing/2014/main" id="{2CEABB78-1981-4542-9477-F6F9986CDBB1}"/>
               </a:ext>
             </a:extLst>
           </p:cNvPr>
@@ -4681,7 +4698,7 @@
     </p:spTree>
     <p:extLst>
       <p:ext uri="{BB962C8B-B14F-4D97-AF65-F5344CB8AC3E}">
-        <p14:creationId xmlns:p14="http://schemas.microsoft.com/office/powerpoint/2010/main" val="303897569"/>
+        <p14:creationId xmlns="" xmlns:p14="http://schemas.microsoft.com/office/powerpoint/2010/main" val="303897569"/>
       </p:ext>
     </p:extLst>
   </p:cSld>
@@ -4713,7 +4730,7 @@
           <p:cNvPr id="2" name="CaixaDeTexto 1">
             <a:extLst>
               <a:ext uri="{FF2B5EF4-FFF2-40B4-BE49-F238E27FC236}">
-                <a16:creationId xmlns:a16="http://schemas.microsoft.com/office/drawing/2014/main" id="{E2289C40-6B36-4906-BF6F-3D1B594D6D57}"/>
+                <a16:creationId xmlns="" xmlns:a16="http://schemas.microsoft.com/office/drawing/2014/main" id="{E2289C40-6B36-4906-BF6F-3D1B594D6D57}"/>
               </a:ext>
             </a:extLst>
           </p:cNvPr>
@@ -4752,7 +4769,7 @@
           <p:cNvPr id="3" name="Retângulo 2">
             <a:extLst>
               <a:ext uri="{FF2B5EF4-FFF2-40B4-BE49-F238E27FC236}">
-                <a16:creationId xmlns:a16="http://schemas.microsoft.com/office/drawing/2014/main" id="{0464F21F-CB9C-45F7-B671-AA1301672C7C}"/>
+                <a16:creationId xmlns="" xmlns:a16="http://schemas.microsoft.com/office/drawing/2014/main" id="{0464F21F-CB9C-45F7-B671-AA1301672C7C}"/>
               </a:ext>
             </a:extLst>
           </p:cNvPr>
@@ -4838,7 +4855,7 @@
           <p:cNvPr id="4" name="CaixaDeTexto 3">
             <a:extLst>
               <a:ext uri="{FF2B5EF4-FFF2-40B4-BE49-F238E27FC236}">
-                <a16:creationId xmlns:a16="http://schemas.microsoft.com/office/drawing/2014/main" id="{2986ED32-27EE-4608-ACDA-A45D763B90F1}"/>
+                <a16:creationId xmlns="" xmlns:a16="http://schemas.microsoft.com/office/drawing/2014/main" id="{2986ED32-27EE-4608-ACDA-A45D763B90F1}"/>
               </a:ext>
             </a:extLst>
           </p:cNvPr>
@@ -4874,7 +4891,7 @@
     </p:spTree>
     <p:extLst>
       <p:ext uri="{BB962C8B-B14F-4D97-AF65-F5344CB8AC3E}">
-        <p14:creationId xmlns:p14="http://schemas.microsoft.com/office/powerpoint/2010/main" val="2538997075"/>
+        <p14:creationId xmlns="" xmlns:p14="http://schemas.microsoft.com/office/powerpoint/2010/main" val="2538997075"/>
       </p:ext>
     </p:extLst>
   </p:cSld>
@@ -4906,7 +4923,7 @@
           <p:cNvPr id="2" name="CaixaDeTexto 1">
             <a:extLst>
               <a:ext uri="{FF2B5EF4-FFF2-40B4-BE49-F238E27FC236}">
-                <a16:creationId xmlns:a16="http://schemas.microsoft.com/office/drawing/2014/main" id="{E2289C40-6B36-4906-BF6F-3D1B594D6D57}"/>
+                <a16:creationId xmlns="" xmlns:a16="http://schemas.microsoft.com/office/drawing/2014/main" id="{E2289C40-6B36-4906-BF6F-3D1B594D6D57}"/>
               </a:ext>
             </a:extLst>
           </p:cNvPr>
@@ -4945,7 +4962,7 @@
           <p:cNvPr id="3" name="Retângulo 2">
             <a:extLst>
               <a:ext uri="{FF2B5EF4-FFF2-40B4-BE49-F238E27FC236}">
-                <a16:creationId xmlns:a16="http://schemas.microsoft.com/office/drawing/2014/main" id="{0464F21F-CB9C-45F7-B671-AA1301672C7C}"/>
+                <a16:creationId xmlns="" xmlns:a16="http://schemas.microsoft.com/office/drawing/2014/main" id="{0464F21F-CB9C-45F7-B671-AA1301672C7C}"/>
               </a:ext>
             </a:extLst>
           </p:cNvPr>
@@ -5008,7 +5025,7 @@
           <p:cNvPr id="4" name="CaixaDeTexto 3">
             <a:extLst>
               <a:ext uri="{FF2B5EF4-FFF2-40B4-BE49-F238E27FC236}">
-                <a16:creationId xmlns:a16="http://schemas.microsoft.com/office/drawing/2014/main" id="{ACB5372C-5619-4615-BA99-8963D2DAED07}"/>
+                <a16:creationId xmlns="" xmlns:a16="http://schemas.microsoft.com/office/drawing/2014/main" id="{ACB5372C-5619-4615-BA99-8963D2DAED07}"/>
               </a:ext>
             </a:extLst>
           </p:cNvPr>
@@ -5044,7 +5061,7 @@
     </p:spTree>
     <p:extLst>
       <p:ext uri="{BB962C8B-B14F-4D97-AF65-F5344CB8AC3E}">
-        <p14:creationId xmlns:p14="http://schemas.microsoft.com/office/powerpoint/2010/main" val="1046586723"/>
+        <p14:creationId xmlns="" xmlns:p14="http://schemas.microsoft.com/office/powerpoint/2010/main" val="1046586723"/>
       </p:ext>
     </p:extLst>
   </p:cSld>
@@ -5076,7 +5093,7 @@
           <p:cNvPr id="2" name="CaixaDeTexto 1">
             <a:extLst>
               <a:ext uri="{FF2B5EF4-FFF2-40B4-BE49-F238E27FC236}">
-                <a16:creationId xmlns:a16="http://schemas.microsoft.com/office/drawing/2014/main" id="{E2289C40-6B36-4906-BF6F-3D1B594D6D57}"/>
+                <a16:creationId xmlns="" xmlns:a16="http://schemas.microsoft.com/office/drawing/2014/main" id="{E2289C40-6B36-4906-BF6F-3D1B594D6D57}"/>
               </a:ext>
             </a:extLst>
           </p:cNvPr>
@@ -5115,7 +5132,7 @@
           <p:cNvPr id="3" name="Retângulo 2">
             <a:extLst>
               <a:ext uri="{FF2B5EF4-FFF2-40B4-BE49-F238E27FC236}">
-                <a16:creationId xmlns:a16="http://schemas.microsoft.com/office/drawing/2014/main" id="{6E4F48DF-7BE3-4E81-BCEE-F95E301A11C3}"/>
+                <a16:creationId xmlns="" xmlns:a16="http://schemas.microsoft.com/office/drawing/2014/main" id="{6E4F48DF-7BE3-4E81-BCEE-F95E301A11C3}"/>
               </a:ext>
             </a:extLst>
           </p:cNvPr>
@@ -5185,7 +5202,7 @@
           <p:cNvPr id="4" name="CaixaDeTexto 3">
             <a:extLst>
               <a:ext uri="{FF2B5EF4-FFF2-40B4-BE49-F238E27FC236}">
-                <a16:creationId xmlns:a16="http://schemas.microsoft.com/office/drawing/2014/main" id="{5F96A4B5-BCBF-4128-AA58-68E853C4C0C1}"/>
+                <a16:creationId xmlns="" xmlns:a16="http://schemas.microsoft.com/office/drawing/2014/main" id="{5F96A4B5-BCBF-4128-AA58-68E853C4C0C1}"/>
               </a:ext>
             </a:extLst>
           </p:cNvPr>
@@ -5221,7 +5238,7 @@
     </p:spTree>
     <p:extLst>
       <p:ext uri="{BB962C8B-B14F-4D97-AF65-F5344CB8AC3E}">
-        <p14:creationId xmlns:p14="http://schemas.microsoft.com/office/powerpoint/2010/main" val="3932015321"/>
+        <p14:creationId xmlns="" xmlns:p14="http://schemas.microsoft.com/office/powerpoint/2010/main" val="3932015321"/>
       </p:ext>
     </p:extLst>
   </p:cSld>
@@ -5253,7 +5270,7 @@
           <p:cNvPr id="2" name="CaixaDeTexto 1">
             <a:extLst>
               <a:ext uri="{FF2B5EF4-FFF2-40B4-BE49-F238E27FC236}">
-                <a16:creationId xmlns:a16="http://schemas.microsoft.com/office/drawing/2014/main" id="{E2289C40-6B36-4906-BF6F-3D1B594D6D57}"/>
+                <a16:creationId xmlns="" xmlns:a16="http://schemas.microsoft.com/office/drawing/2014/main" id="{E2289C40-6B36-4906-BF6F-3D1B594D6D57}"/>
               </a:ext>
             </a:extLst>
           </p:cNvPr>
@@ -5292,7 +5309,7 @@
           <p:cNvPr id="3" name="Retângulo 2">
             <a:extLst>
               <a:ext uri="{FF2B5EF4-FFF2-40B4-BE49-F238E27FC236}">
-                <a16:creationId xmlns:a16="http://schemas.microsoft.com/office/drawing/2014/main" id="{6E4F48DF-7BE3-4E81-BCEE-F95E301A11C3}"/>
+                <a16:creationId xmlns="" xmlns:a16="http://schemas.microsoft.com/office/drawing/2014/main" id="{6E4F48DF-7BE3-4E81-BCEE-F95E301A11C3}"/>
               </a:ext>
             </a:extLst>
           </p:cNvPr>
@@ -5354,7 +5371,7 @@
           <p:cNvPr id="4" name="CaixaDeTexto 3">
             <a:extLst>
               <a:ext uri="{FF2B5EF4-FFF2-40B4-BE49-F238E27FC236}">
-                <a16:creationId xmlns:a16="http://schemas.microsoft.com/office/drawing/2014/main" id="{6BFF6B08-BA12-4A27-A6FB-E5AD25D2188C}"/>
+                <a16:creationId xmlns="" xmlns:a16="http://schemas.microsoft.com/office/drawing/2014/main" id="{6BFF6B08-BA12-4A27-A6FB-E5AD25D2188C}"/>
               </a:ext>
             </a:extLst>
           </p:cNvPr>
@@ -5390,7 +5407,7 @@
     </p:spTree>
     <p:extLst>
       <p:ext uri="{BB962C8B-B14F-4D97-AF65-F5344CB8AC3E}">
-        <p14:creationId xmlns:p14="http://schemas.microsoft.com/office/powerpoint/2010/main" val="3981785778"/>
+        <p14:creationId xmlns="" xmlns:p14="http://schemas.microsoft.com/office/powerpoint/2010/main" val="3981785778"/>
       </p:ext>
     </p:extLst>
   </p:cSld>
@@ -5422,7 +5439,7 @@
           <p:cNvPr id="2" name="CaixaDeTexto 1">
             <a:extLst>
               <a:ext uri="{FF2B5EF4-FFF2-40B4-BE49-F238E27FC236}">
-                <a16:creationId xmlns:a16="http://schemas.microsoft.com/office/drawing/2014/main" id="{E2289C40-6B36-4906-BF6F-3D1B594D6D57}"/>
+                <a16:creationId xmlns="" xmlns:a16="http://schemas.microsoft.com/office/drawing/2014/main" id="{E2289C40-6B36-4906-BF6F-3D1B594D6D57}"/>
               </a:ext>
             </a:extLst>
           </p:cNvPr>
@@ -5461,7 +5478,7 @@
           <p:cNvPr id="3" name="Retângulo 2">
             <a:extLst>
               <a:ext uri="{FF2B5EF4-FFF2-40B4-BE49-F238E27FC236}">
-                <a16:creationId xmlns:a16="http://schemas.microsoft.com/office/drawing/2014/main" id="{6E4F48DF-7BE3-4E81-BCEE-F95E301A11C3}"/>
+                <a16:creationId xmlns="" xmlns:a16="http://schemas.microsoft.com/office/drawing/2014/main" id="{6E4F48DF-7BE3-4E81-BCEE-F95E301A11C3}"/>
               </a:ext>
             </a:extLst>
           </p:cNvPr>
@@ -5523,7 +5540,7 @@
           <p:cNvPr id="4" name="CaixaDeTexto 3">
             <a:extLst>
               <a:ext uri="{FF2B5EF4-FFF2-40B4-BE49-F238E27FC236}">
-                <a16:creationId xmlns:a16="http://schemas.microsoft.com/office/drawing/2014/main" id="{D2E0FDAC-7CB4-4675-900E-00A8FF1FFE1A}"/>
+                <a16:creationId xmlns="" xmlns:a16="http://schemas.microsoft.com/office/drawing/2014/main" id="{D2E0FDAC-7CB4-4675-900E-00A8FF1FFE1A}"/>
               </a:ext>
             </a:extLst>
           </p:cNvPr>
@@ -5559,7 +5576,7 @@
     </p:spTree>
     <p:extLst>
       <p:ext uri="{BB962C8B-B14F-4D97-AF65-F5344CB8AC3E}">
-        <p14:creationId xmlns:p14="http://schemas.microsoft.com/office/powerpoint/2010/main" val="1782597892"/>
+        <p14:creationId xmlns="" xmlns:p14="http://schemas.microsoft.com/office/powerpoint/2010/main" val="1782597892"/>
       </p:ext>
     </p:extLst>
   </p:cSld>
@@ -5591,7 +5608,7 @@
           <p:cNvPr id="2" name="CaixaDeTexto 1">
             <a:extLst>
               <a:ext uri="{FF2B5EF4-FFF2-40B4-BE49-F238E27FC236}">
-                <a16:creationId xmlns:a16="http://schemas.microsoft.com/office/drawing/2014/main" id="{E2289C40-6B36-4906-BF6F-3D1B594D6D57}"/>
+                <a16:creationId xmlns="" xmlns:a16="http://schemas.microsoft.com/office/drawing/2014/main" id="{E2289C40-6B36-4906-BF6F-3D1B594D6D57}"/>
               </a:ext>
             </a:extLst>
           </p:cNvPr>
@@ -5630,7 +5647,7 @@
           <p:cNvPr id="3" name="Retângulo 2">
             <a:extLst>
               <a:ext uri="{FF2B5EF4-FFF2-40B4-BE49-F238E27FC236}">
-                <a16:creationId xmlns:a16="http://schemas.microsoft.com/office/drawing/2014/main" id="{6E4F48DF-7BE3-4E81-BCEE-F95E301A11C3}"/>
+                <a16:creationId xmlns="" xmlns:a16="http://schemas.microsoft.com/office/drawing/2014/main" id="{6E4F48DF-7BE3-4E81-BCEE-F95E301A11C3}"/>
               </a:ext>
             </a:extLst>
           </p:cNvPr>
@@ -5708,7 +5725,7 @@
           <p:cNvPr id="4" name="CaixaDeTexto 3">
             <a:extLst>
               <a:ext uri="{FF2B5EF4-FFF2-40B4-BE49-F238E27FC236}">
-                <a16:creationId xmlns:a16="http://schemas.microsoft.com/office/drawing/2014/main" id="{A669B354-350D-4C90-B1CF-E0DF5E164E9D}"/>
+                <a16:creationId xmlns="" xmlns:a16="http://schemas.microsoft.com/office/drawing/2014/main" id="{A669B354-350D-4C90-B1CF-E0DF5E164E9D}"/>
               </a:ext>
             </a:extLst>
           </p:cNvPr>
@@ -5744,7 +5761,7 @@
     </p:spTree>
     <p:extLst>
       <p:ext uri="{BB962C8B-B14F-4D97-AF65-F5344CB8AC3E}">
-        <p14:creationId xmlns:p14="http://schemas.microsoft.com/office/powerpoint/2010/main" val="282548394"/>
+        <p14:creationId xmlns="" xmlns:p14="http://schemas.microsoft.com/office/powerpoint/2010/main" val="282548394"/>
       </p:ext>
     </p:extLst>
   </p:cSld>
@@ -5776,7 +5793,7 @@
           <p:cNvPr id="2" name="CaixaDeTexto 1">
             <a:extLst>
               <a:ext uri="{FF2B5EF4-FFF2-40B4-BE49-F238E27FC236}">
-                <a16:creationId xmlns:a16="http://schemas.microsoft.com/office/drawing/2014/main" id="{E2289C40-6B36-4906-BF6F-3D1B594D6D57}"/>
+                <a16:creationId xmlns="" xmlns:a16="http://schemas.microsoft.com/office/drawing/2014/main" id="{E2289C40-6B36-4906-BF6F-3D1B594D6D57}"/>
               </a:ext>
             </a:extLst>
           </p:cNvPr>
@@ -5815,7 +5832,7 @@
           <p:cNvPr id="3" name="Retângulo 2">
             <a:extLst>
               <a:ext uri="{FF2B5EF4-FFF2-40B4-BE49-F238E27FC236}">
-                <a16:creationId xmlns:a16="http://schemas.microsoft.com/office/drawing/2014/main" id="{6E4F48DF-7BE3-4E81-BCEE-F95E301A11C3}"/>
+                <a16:creationId xmlns="" xmlns:a16="http://schemas.microsoft.com/office/drawing/2014/main" id="{6E4F48DF-7BE3-4E81-BCEE-F95E301A11C3}"/>
               </a:ext>
             </a:extLst>
           </p:cNvPr>
@@ -5877,7 +5894,7 @@
           <p:cNvPr id="4" name="CaixaDeTexto 3">
             <a:extLst>
               <a:ext uri="{FF2B5EF4-FFF2-40B4-BE49-F238E27FC236}">
-                <a16:creationId xmlns:a16="http://schemas.microsoft.com/office/drawing/2014/main" id="{C36FC670-86D1-44ED-81A6-560366F90D65}"/>
+                <a16:creationId xmlns="" xmlns:a16="http://schemas.microsoft.com/office/drawing/2014/main" id="{C36FC670-86D1-44ED-81A6-560366F90D65}"/>
               </a:ext>
             </a:extLst>
           </p:cNvPr>
@@ -5913,7 +5930,7 @@
     </p:spTree>
     <p:extLst>
       <p:ext uri="{BB962C8B-B14F-4D97-AF65-F5344CB8AC3E}">
-        <p14:creationId xmlns:p14="http://schemas.microsoft.com/office/powerpoint/2010/main" val="1923219699"/>
+        <p14:creationId xmlns="" xmlns:p14="http://schemas.microsoft.com/office/powerpoint/2010/main" val="1923219699"/>
       </p:ext>
     </p:extLst>
   </p:cSld>
@@ -5945,7 +5962,7 @@
           <p:cNvPr id="2" name="CaixaDeTexto 1">
             <a:extLst>
               <a:ext uri="{FF2B5EF4-FFF2-40B4-BE49-F238E27FC236}">
-                <a16:creationId xmlns:a16="http://schemas.microsoft.com/office/drawing/2014/main" id="{E2289C40-6B36-4906-BF6F-3D1B594D6D57}"/>
+                <a16:creationId xmlns="" xmlns:a16="http://schemas.microsoft.com/office/drawing/2014/main" id="{E2289C40-6B36-4906-BF6F-3D1B594D6D57}"/>
               </a:ext>
             </a:extLst>
           </p:cNvPr>
@@ -5984,7 +6001,7 @@
           <p:cNvPr id="5" name="Retângulo 4">
             <a:extLst>
               <a:ext uri="{FF2B5EF4-FFF2-40B4-BE49-F238E27FC236}">
-                <a16:creationId xmlns:a16="http://schemas.microsoft.com/office/drawing/2014/main" id="{C4351BF4-6949-465B-A55A-C8561462CF2E}"/>
+                <a16:creationId xmlns="" xmlns:a16="http://schemas.microsoft.com/office/drawing/2014/main" id="{C4351BF4-6949-465B-A55A-C8561462CF2E}"/>
               </a:ext>
             </a:extLst>
           </p:cNvPr>
@@ -6026,7 +6043,7 @@
           <p:cNvPr id="6" name="CaixaDeTexto 5">
             <a:extLst>
               <a:ext uri="{FF2B5EF4-FFF2-40B4-BE49-F238E27FC236}">
-                <a16:creationId xmlns:a16="http://schemas.microsoft.com/office/drawing/2014/main" id="{D5F67441-A755-4247-851C-41974715F282}"/>
+                <a16:creationId xmlns="" xmlns:a16="http://schemas.microsoft.com/office/drawing/2014/main" id="{D5F67441-A755-4247-851C-41974715F282}"/>
               </a:ext>
             </a:extLst>
           </p:cNvPr>
@@ -6110,7 +6127,7 @@
           <p:cNvPr id="7" name="Retângulo 4">
             <a:extLst>
               <a:ext uri="{FF2B5EF4-FFF2-40B4-BE49-F238E27FC236}">
-                <a16:creationId xmlns:a16="http://schemas.microsoft.com/office/drawing/2014/main" id="{F98E677B-3EA7-49FD-AAB2-91F960419DAB}"/>
+                <a16:creationId xmlns="" xmlns:a16="http://schemas.microsoft.com/office/drawing/2014/main" id="{F98E677B-3EA7-49FD-AAB2-91F960419DAB}"/>
               </a:ext>
             </a:extLst>
           </p:cNvPr>
@@ -6150,7 +6167,7 @@
     </p:spTree>
     <p:extLst>
       <p:ext uri="{BB962C8B-B14F-4D97-AF65-F5344CB8AC3E}">
-        <p14:creationId xmlns:p14="http://schemas.microsoft.com/office/powerpoint/2010/main" val="351260889"/>
+        <p14:creationId xmlns="" xmlns:p14="http://schemas.microsoft.com/office/powerpoint/2010/main" val="351260889"/>
       </p:ext>
     </p:extLst>
   </p:cSld>
@@ -6182,7 +6199,7 @@
           <p:cNvPr id="2" name="CaixaDeTexto 1">
             <a:extLst>
               <a:ext uri="{FF2B5EF4-FFF2-40B4-BE49-F238E27FC236}">
-                <a16:creationId xmlns:a16="http://schemas.microsoft.com/office/drawing/2014/main" id="{E2289C40-6B36-4906-BF6F-3D1B594D6D57}"/>
+                <a16:creationId xmlns="" xmlns:a16="http://schemas.microsoft.com/office/drawing/2014/main" id="{E2289C40-6B36-4906-BF6F-3D1B594D6D57}"/>
               </a:ext>
             </a:extLst>
           </p:cNvPr>
@@ -6221,7 +6238,7 @@
           <p:cNvPr id="5" name="Retângulo 4">
             <a:extLst>
               <a:ext uri="{FF2B5EF4-FFF2-40B4-BE49-F238E27FC236}">
-                <a16:creationId xmlns:a16="http://schemas.microsoft.com/office/drawing/2014/main" id="{C4351BF4-6949-465B-A55A-C8561462CF2E}"/>
+                <a16:creationId xmlns="" xmlns:a16="http://schemas.microsoft.com/office/drawing/2014/main" id="{C4351BF4-6949-465B-A55A-C8561462CF2E}"/>
               </a:ext>
             </a:extLst>
           </p:cNvPr>
@@ -6263,7 +6280,7 @@
           <p:cNvPr id="7" name="Retângulo 4">
             <a:extLst>
               <a:ext uri="{FF2B5EF4-FFF2-40B4-BE49-F238E27FC236}">
-                <a16:creationId xmlns:a16="http://schemas.microsoft.com/office/drawing/2014/main" id="{6F061871-FDA0-491B-B84B-B5AB0970885B}"/>
+                <a16:creationId xmlns="" xmlns:a16="http://schemas.microsoft.com/office/drawing/2014/main" id="{6F061871-FDA0-491B-B84B-B5AB0970885B}"/>
               </a:ext>
             </a:extLst>
           </p:cNvPr>
@@ -6305,7 +6322,7 @@
           <p:cNvPr id="14" name="CaixaDeTexto 5">
             <a:extLst>
               <a:ext uri="{FF2B5EF4-FFF2-40B4-BE49-F238E27FC236}">
-                <a16:creationId xmlns:a16="http://schemas.microsoft.com/office/drawing/2014/main" id="{07CA8BF6-9A49-441F-836D-9072850A59D4}"/>
+                <a16:creationId xmlns="" xmlns:a16="http://schemas.microsoft.com/office/drawing/2014/main" id="{07CA8BF6-9A49-441F-836D-9072850A59D4}"/>
               </a:ext>
             </a:extLst>
           </p:cNvPr>
@@ -6349,7 +6366,7 @@
           <p:cNvPr id="15" name="Picture 14" descr="A screenshot of a cell phone&#10;&#10;Description automatically generated">
             <a:extLst>
               <a:ext uri="{FF2B5EF4-FFF2-40B4-BE49-F238E27FC236}">
-                <a16:creationId xmlns:a16="http://schemas.microsoft.com/office/drawing/2014/main" id="{2F22A74C-3364-4DD1-BBA7-38E977DAC637}"/>
+                <a16:creationId xmlns="" xmlns:a16="http://schemas.microsoft.com/office/drawing/2014/main" id="{2F22A74C-3364-4DD1-BBA7-38E977DAC637}"/>
               </a:ext>
             </a:extLst>
           </p:cNvPr>
@@ -6359,10 +6376,10 @@
           <p:nvPr/>
         </p:nvPicPr>
         <p:blipFill>
-          <a:blip r:embed="rId2">
+          <a:blip r:embed="rId2" cstate="print">
             <a:extLst>
               <a:ext uri="{28A0092B-C50C-407E-A947-70E740481C1C}">
-                <a14:useLocalDpi xmlns:a14="http://schemas.microsoft.com/office/drawing/2010/main" val="0"/>
+                <a14:useLocalDpi xmlns="" xmlns:a14="http://schemas.microsoft.com/office/drawing/2010/main" val="0"/>
               </a:ext>
             </a:extLst>
           </a:blip>
@@ -6385,7 +6402,7 @@
           <p:cNvPr id="16" name="Picture 15">
             <a:extLst>
               <a:ext uri="{FF2B5EF4-FFF2-40B4-BE49-F238E27FC236}">
-                <a16:creationId xmlns:a16="http://schemas.microsoft.com/office/drawing/2014/main" id="{B1A27C00-ABA4-4EE5-95D2-97D339292616}"/>
+                <a16:creationId xmlns="" xmlns:a16="http://schemas.microsoft.com/office/drawing/2014/main" id="{B1A27C00-ABA4-4EE5-95D2-97D339292616}"/>
               </a:ext>
             </a:extLst>
           </p:cNvPr>
@@ -6395,7 +6412,7 @@
           <p:nvPr/>
         </p:nvPicPr>
         <p:blipFill>
-          <a:blip r:embed="rId3"/>
+          <a:blip r:embed="rId3" cstate="print"/>
           <a:stretch>
             <a:fillRect/>
           </a:stretch>
@@ -6415,7 +6432,7 @@
           <p:cNvPr id="17" name="Picture 16">
             <a:extLst>
               <a:ext uri="{FF2B5EF4-FFF2-40B4-BE49-F238E27FC236}">
-                <a16:creationId xmlns:a16="http://schemas.microsoft.com/office/drawing/2014/main" id="{D6CEEE49-8720-460A-9FA7-E01A051D6D3D}"/>
+                <a16:creationId xmlns="" xmlns:a16="http://schemas.microsoft.com/office/drawing/2014/main" id="{D6CEEE49-8720-460A-9FA7-E01A051D6D3D}"/>
               </a:ext>
             </a:extLst>
           </p:cNvPr>
@@ -6425,7 +6442,7 @@
           <p:nvPr/>
         </p:nvPicPr>
         <p:blipFill>
-          <a:blip r:embed="rId4"/>
+          <a:blip r:embed="rId4" cstate="print"/>
           <a:stretch>
             <a:fillRect/>
           </a:stretch>
@@ -6445,7 +6462,7 @@
           <p:cNvPr id="18" name="CaixaDeTexto 5">
             <a:extLst>
               <a:ext uri="{FF2B5EF4-FFF2-40B4-BE49-F238E27FC236}">
-                <a16:creationId xmlns:a16="http://schemas.microsoft.com/office/drawing/2014/main" id="{E05EE9CB-CEAD-49FB-B917-F3911C866716}"/>
+                <a16:creationId xmlns="" xmlns:a16="http://schemas.microsoft.com/office/drawing/2014/main" id="{E05EE9CB-CEAD-49FB-B917-F3911C866716}"/>
               </a:ext>
             </a:extLst>
           </p:cNvPr>
@@ -6502,7 +6519,7 @@
           <p:cNvPr id="19" name="Straight Connector 18">
             <a:extLst>
               <a:ext uri="{FF2B5EF4-FFF2-40B4-BE49-F238E27FC236}">
-                <a16:creationId xmlns:a16="http://schemas.microsoft.com/office/drawing/2014/main" id="{5E198959-BDE7-4419-BDC5-99C20E0B5EC8}"/>
+                <a16:creationId xmlns="" xmlns:a16="http://schemas.microsoft.com/office/drawing/2014/main" id="{5E198959-BDE7-4419-BDC5-99C20E0B5EC8}"/>
               </a:ext>
             </a:extLst>
           </p:cNvPr>
@@ -6543,7 +6560,7 @@
           <p:cNvPr id="3" name="Picture 2">
             <a:extLst>
               <a:ext uri="{FF2B5EF4-FFF2-40B4-BE49-F238E27FC236}">
-                <a16:creationId xmlns:a16="http://schemas.microsoft.com/office/drawing/2014/main" id="{36078AE8-5334-447D-AD43-BB3AF83E359B}"/>
+                <a16:creationId xmlns="" xmlns:a16="http://schemas.microsoft.com/office/drawing/2014/main" id="{36078AE8-5334-447D-AD43-BB3AF83E359B}"/>
               </a:ext>
             </a:extLst>
           </p:cNvPr>
@@ -6553,7 +6570,7 @@
           <p:nvPr/>
         </p:nvPicPr>
         <p:blipFill>
-          <a:blip r:embed="rId6"/>
+          <a:blip r:embed="rId6" cstate="print"/>
           <a:stretch>
             <a:fillRect/>
           </a:stretch>
@@ -6571,7 +6588,7 @@
     </p:spTree>
     <p:extLst>
       <p:ext uri="{BB962C8B-B14F-4D97-AF65-F5344CB8AC3E}">
-        <p14:creationId xmlns:p14="http://schemas.microsoft.com/office/powerpoint/2010/main" val="3921174963"/>
+        <p14:creationId xmlns="" xmlns:p14="http://schemas.microsoft.com/office/powerpoint/2010/main" val="3921174963"/>
       </p:ext>
     </p:extLst>
   </p:cSld>
@@ -6603,7 +6620,7 @@
           <p:cNvPr id="2" name="CaixaDeTexto 1">
             <a:extLst>
               <a:ext uri="{FF2B5EF4-FFF2-40B4-BE49-F238E27FC236}">
-                <a16:creationId xmlns:a16="http://schemas.microsoft.com/office/drawing/2014/main" id="{E2289C40-6B36-4906-BF6F-3D1B594D6D57}"/>
+                <a16:creationId xmlns="" xmlns:a16="http://schemas.microsoft.com/office/drawing/2014/main" id="{E2289C40-6B36-4906-BF6F-3D1B594D6D57}"/>
               </a:ext>
             </a:extLst>
           </p:cNvPr>
@@ -6642,7 +6659,7 @@
           <p:cNvPr id="5" name="Retângulo 4">
             <a:extLst>
               <a:ext uri="{FF2B5EF4-FFF2-40B4-BE49-F238E27FC236}">
-                <a16:creationId xmlns:a16="http://schemas.microsoft.com/office/drawing/2014/main" id="{C4351BF4-6949-465B-A55A-C8561462CF2E}"/>
+                <a16:creationId xmlns="" xmlns:a16="http://schemas.microsoft.com/office/drawing/2014/main" id="{C4351BF4-6949-465B-A55A-C8561462CF2E}"/>
               </a:ext>
             </a:extLst>
           </p:cNvPr>
@@ -6684,7 +6701,7 @@
           <p:cNvPr id="7" name="Retângulo 4">
             <a:extLst>
               <a:ext uri="{FF2B5EF4-FFF2-40B4-BE49-F238E27FC236}">
-                <a16:creationId xmlns:a16="http://schemas.microsoft.com/office/drawing/2014/main" id="{6F061871-FDA0-491B-B84B-B5AB0970885B}"/>
+                <a16:creationId xmlns="" xmlns:a16="http://schemas.microsoft.com/office/drawing/2014/main" id="{6F061871-FDA0-491B-B84B-B5AB0970885B}"/>
               </a:ext>
             </a:extLst>
           </p:cNvPr>
@@ -6726,7 +6743,7 @@
           <p:cNvPr id="17" name="CaixaDeTexto 5">
             <a:extLst>
               <a:ext uri="{FF2B5EF4-FFF2-40B4-BE49-F238E27FC236}">
-                <a16:creationId xmlns:a16="http://schemas.microsoft.com/office/drawing/2014/main" id="{0EACA767-5D74-4C51-98B7-763F041F495E}"/>
+                <a16:creationId xmlns="" xmlns:a16="http://schemas.microsoft.com/office/drawing/2014/main" id="{0EACA767-5D74-4C51-98B7-763F041F495E}"/>
               </a:ext>
             </a:extLst>
           </p:cNvPr>
@@ -6797,7 +6814,7 @@
           <p:cNvPr id="8" name="Group 7">
             <a:extLst>
               <a:ext uri="{FF2B5EF4-FFF2-40B4-BE49-F238E27FC236}">
-                <a16:creationId xmlns:a16="http://schemas.microsoft.com/office/drawing/2014/main" id="{1E163097-A71F-4360-857F-CDF7256C8A07}"/>
+                <a16:creationId xmlns="" xmlns:a16="http://schemas.microsoft.com/office/drawing/2014/main" id="{1E163097-A71F-4360-857F-CDF7256C8A07}"/>
               </a:ext>
             </a:extLst>
           </p:cNvPr>
@@ -6817,7 +6834,7 @@
             <p:cNvPr id="4" name="Graphic 3" descr="Person with idea">
               <a:extLst>
                 <a:ext uri="{FF2B5EF4-FFF2-40B4-BE49-F238E27FC236}">
-                  <a16:creationId xmlns:a16="http://schemas.microsoft.com/office/drawing/2014/main" id="{2AFB5B40-0E71-438C-A693-F6960B64154E}"/>
+                  <a16:creationId xmlns="" xmlns:a16="http://schemas.microsoft.com/office/drawing/2014/main" id="{2AFB5B40-0E71-438C-A693-F6960B64154E}"/>
                 </a:ext>
               </a:extLst>
             </p:cNvPr>
@@ -6827,13 +6844,13 @@
             <p:nvPr/>
           </p:nvPicPr>
           <p:blipFill>
-            <a:blip r:embed="rId2">
+            <a:blip r:embed="rId2" cstate="print">
               <a:extLst>
                 <a:ext uri="{28A0092B-C50C-407E-A947-70E740481C1C}">
-                  <a14:useLocalDpi xmlns:a14="http://schemas.microsoft.com/office/drawing/2010/main" val="0"/>
+                  <a14:useLocalDpi xmlns="" xmlns:a14="http://schemas.microsoft.com/office/drawing/2010/main" val="0"/>
                 </a:ext>
                 <a:ext uri="{96DAC541-7B7A-43D3-8B79-37D633B846F1}">
-                  <asvg:svgBlip xmlns:asvg="http://schemas.microsoft.com/office/drawing/2016/SVG/main" r:embed="rId3"/>
+                  <asvg:svgBlip xmlns="" xmlns:asvg="http://schemas.microsoft.com/office/drawing/2016/SVG/main" r:embed="rId3"/>
                 </a:ext>
               </a:extLst>
             </a:blip>
@@ -6856,7 +6873,7 @@
             <p:cNvPr id="6" name="Rectangle 5">
               <a:extLst>
                 <a:ext uri="{FF2B5EF4-FFF2-40B4-BE49-F238E27FC236}">
-                  <a16:creationId xmlns:a16="http://schemas.microsoft.com/office/drawing/2014/main" id="{AD1205DC-63D6-44A4-B20E-BC9057891E98}"/>
+                  <a16:creationId xmlns="" xmlns:a16="http://schemas.microsoft.com/office/drawing/2014/main" id="{AD1205DC-63D6-44A4-B20E-BC9057891E98}"/>
                 </a:ext>
               </a:extLst>
             </p:cNvPr>
@@ -6970,6 +6987,10 @@
                 <a:rPr lang="pt-BR" sz="1400" i="1" dirty="0"/>
                 <a:t>." </a:t>
               </a:r>
+              <a:r>
+                <a:rPr lang="pt-BR" sz="1400" dirty="0"/>
+                <a:t/>
+              </a:r>
               <a:br>
                 <a:rPr lang="pt-BR" sz="1400" dirty="0"/>
               </a:br>
@@ -7008,7 +7029,7 @@
     </p:spTree>
     <p:extLst>
       <p:ext uri="{BB962C8B-B14F-4D97-AF65-F5344CB8AC3E}">
-        <p14:creationId xmlns:p14="http://schemas.microsoft.com/office/powerpoint/2010/main" val="1275928961"/>
+        <p14:creationId xmlns="" xmlns:p14="http://schemas.microsoft.com/office/powerpoint/2010/main" val="1275928961"/>
       </p:ext>
     </p:extLst>
   </p:cSld>
@@ -7040,7 +7061,7 @@
           <p:cNvPr id="2" name="CaixaDeTexto 1">
             <a:extLst>
               <a:ext uri="{FF2B5EF4-FFF2-40B4-BE49-F238E27FC236}">
-                <a16:creationId xmlns:a16="http://schemas.microsoft.com/office/drawing/2014/main" id="{E2289C40-6B36-4906-BF6F-3D1B594D6D57}"/>
+                <a16:creationId xmlns="" xmlns:a16="http://schemas.microsoft.com/office/drawing/2014/main" id="{E2289C40-6B36-4906-BF6F-3D1B594D6D57}"/>
               </a:ext>
             </a:extLst>
           </p:cNvPr>
@@ -7079,7 +7100,7 @@
           <p:cNvPr id="5" name="Retângulo 4">
             <a:extLst>
               <a:ext uri="{FF2B5EF4-FFF2-40B4-BE49-F238E27FC236}">
-                <a16:creationId xmlns:a16="http://schemas.microsoft.com/office/drawing/2014/main" id="{C4351BF4-6949-465B-A55A-C8561462CF2E}"/>
+                <a16:creationId xmlns="" xmlns:a16="http://schemas.microsoft.com/office/drawing/2014/main" id="{C4351BF4-6949-465B-A55A-C8561462CF2E}"/>
               </a:ext>
             </a:extLst>
           </p:cNvPr>
@@ -7137,7 +7158,7 @@
           <p:cNvPr id="4" name="CaixaDeTexto 3">
             <a:extLst>
               <a:ext uri="{FF2B5EF4-FFF2-40B4-BE49-F238E27FC236}">
-                <a16:creationId xmlns:a16="http://schemas.microsoft.com/office/drawing/2014/main" id="{6C14915E-E529-4FEB-989B-94707A646704}"/>
+                <a16:creationId xmlns="" xmlns:a16="http://schemas.microsoft.com/office/drawing/2014/main" id="{6C14915E-E529-4FEB-989B-94707A646704}"/>
               </a:ext>
             </a:extLst>
           </p:cNvPr>
@@ -7147,7 +7168,7 @@
         <p:spPr>
           <a:xfrm>
             <a:off x="176644" y="2016087"/>
-            <a:ext cx="11919876" cy="430887"/>
+            <a:ext cx="11919876" cy="1785104"/>
           </a:xfrm>
           <a:prstGeom prst="rect">
             <a:avLst/>
@@ -7164,16 +7185,54 @@
           <a:lstStyle/>
           <a:p>
             <a:r>
-              <a:rPr lang="pt-BR" sz="2200" i="1" dirty="0"/>
-              <a:t>Escrever aqui</a:t>
-            </a:r>
+              <a:rPr lang="pt-BR" sz="2200" i="1" dirty="0" smtClean="0"/>
+              <a:t>Diante do contexto descrito, apresentam-se os questionamentos à serem abordados nessa pesquisa:</a:t>
+            </a:r>
+          </a:p>
+          <a:p>
+            <a:endParaRPr lang="pt-BR" sz="2200" i="1" dirty="0" smtClean="0"/>
+          </a:p>
+          <a:p>
+            <a:pPr marL="457200" indent="-457200">
+              <a:buFont typeface="+mj-lt"/>
+              <a:buAutoNum type="arabicPeriod"/>
+            </a:pPr>
+            <a:r>
+              <a:rPr lang="pt-BR" sz="2200" b="1" i="1" dirty="0" smtClean="0"/>
+              <a:t>Como identificar </a:t>
+            </a:r>
+            <a:r>
+              <a:rPr lang="pt-BR" sz="2200" b="1" i="1" dirty="0" smtClean="0"/>
+              <a:t>de forma </a:t>
+            </a:r>
+            <a:r>
+              <a:rPr lang="pt-BR" sz="2200" b="1" i="1" dirty="0" smtClean="0"/>
+              <a:t>automatizada, </a:t>
+            </a:r>
+            <a:r>
+              <a:rPr lang="pt-BR" sz="2200" b="1" i="1" dirty="0" smtClean="0"/>
+              <a:t>se as </a:t>
+            </a:r>
+            <a:r>
+              <a:rPr lang="pt-BR" sz="2200" b="1" i="1" dirty="0" smtClean="0"/>
+              <a:t>pessoas (ex: consumidores em supermercados, passageiros no transporte público, pessoas nos aeroportos) </a:t>
+            </a:r>
+            <a:r>
+              <a:rPr lang="pt-BR" sz="2200" b="1" i="1" dirty="0" smtClean="0"/>
+              <a:t>estão utilizando </a:t>
+            </a:r>
+            <a:r>
+              <a:rPr lang="pt-BR" sz="2200" b="1" i="1" dirty="0" smtClean="0"/>
+              <a:t>máscaras de proteção facial ?</a:t>
+            </a:r>
+            <a:endParaRPr lang="pt-BR" sz="2200" b="1" i="1" dirty="0"/>
           </a:p>
         </p:txBody>
       </p:sp>
     </p:spTree>
     <p:extLst>
       <p:ext uri="{BB962C8B-B14F-4D97-AF65-F5344CB8AC3E}">
-        <p14:creationId xmlns:p14="http://schemas.microsoft.com/office/powerpoint/2010/main" val="3817115773"/>
+        <p14:creationId xmlns="" xmlns:p14="http://schemas.microsoft.com/office/powerpoint/2010/main" val="3817115773"/>
       </p:ext>
     </p:extLst>
   </p:cSld>
@@ -7205,7 +7264,7 @@
           <p:cNvPr id="2" name="CaixaDeTexto 1">
             <a:extLst>
               <a:ext uri="{FF2B5EF4-FFF2-40B4-BE49-F238E27FC236}">
-                <a16:creationId xmlns:a16="http://schemas.microsoft.com/office/drawing/2014/main" id="{E2289C40-6B36-4906-BF6F-3D1B594D6D57}"/>
+                <a16:creationId xmlns="" xmlns:a16="http://schemas.microsoft.com/office/drawing/2014/main" id="{E2289C40-6B36-4906-BF6F-3D1B594D6D57}"/>
               </a:ext>
             </a:extLst>
           </p:cNvPr>
@@ -7244,7 +7303,7 @@
           <p:cNvPr id="5" name="Retângulo 4">
             <a:extLst>
               <a:ext uri="{FF2B5EF4-FFF2-40B4-BE49-F238E27FC236}">
-                <a16:creationId xmlns:a16="http://schemas.microsoft.com/office/drawing/2014/main" id="{C4351BF4-6949-465B-A55A-C8561462CF2E}"/>
+                <a16:creationId xmlns="" xmlns:a16="http://schemas.microsoft.com/office/drawing/2014/main" id="{C4351BF4-6949-465B-A55A-C8561462CF2E}"/>
               </a:ext>
             </a:extLst>
           </p:cNvPr>
@@ -7302,7 +7361,7 @@
           <p:cNvPr id="4" name="CaixaDeTexto 3">
             <a:extLst>
               <a:ext uri="{FF2B5EF4-FFF2-40B4-BE49-F238E27FC236}">
-                <a16:creationId xmlns:a16="http://schemas.microsoft.com/office/drawing/2014/main" id="{84CA2768-938F-4EEA-B0DD-BAF05149B6F5}"/>
+                <a16:creationId xmlns="" xmlns:a16="http://schemas.microsoft.com/office/drawing/2014/main" id="{84CA2768-938F-4EEA-B0DD-BAF05149B6F5}"/>
               </a:ext>
             </a:extLst>
           </p:cNvPr>
@@ -7312,7 +7371,7 @@
         <p:spPr>
           <a:xfrm>
             <a:off x="176644" y="2016087"/>
-            <a:ext cx="11919876" cy="430887"/>
+            <a:ext cx="11919876" cy="4493538"/>
           </a:xfrm>
           <a:prstGeom prst="rect">
             <a:avLst/>
@@ -7329,16 +7388,138 @@
           <a:lstStyle/>
           <a:p>
             <a:r>
-              <a:rPr lang="pt-BR" sz="2200" i="1" dirty="0"/>
-              <a:t>Escrever aqui</a:t>
-            </a:r>
+              <a:rPr lang="pt-BR" sz="2200" i="1" dirty="0" smtClean="0"/>
+              <a:t>Objetivo geral: </a:t>
+            </a:r>
+            <a:r>
+              <a:rPr lang="pt-BR" sz="2200" b="1" i="1" dirty="0" smtClean="0"/>
+              <a:t>Identificar de forma </a:t>
+            </a:r>
+            <a:r>
+              <a:rPr lang="pt-BR" sz="2200" b="1" i="1" dirty="0" smtClean="0"/>
+              <a:t>automatizada, se as pessoas </a:t>
+            </a:r>
+            <a:r>
+              <a:rPr lang="pt-BR" sz="2200" b="1" i="1" dirty="0" smtClean="0"/>
+              <a:t>estão </a:t>
+            </a:r>
+            <a:r>
+              <a:rPr lang="pt-BR" sz="2200" b="1" i="1" dirty="0" smtClean="0"/>
+              <a:t>utilizando máscaras de proteção </a:t>
+            </a:r>
+            <a:r>
+              <a:rPr lang="pt-BR" sz="2200" b="1" i="1" dirty="0" smtClean="0"/>
+              <a:t>facial.</a:t>
+            </a:r>
+          </a:p>
+          <a:p>
+            <a:endParaRPr lang="pt-BR" sz="2200" b="1" i="1" dirty="0" smtClean="0"/>
+          </a:p>
+          <a:p>
+            <a:r>
+              <a:rPr lang="pt-BR" sz="2200" i="1" dirty="0" smtClean="0"/>
+              <a:t>Objetivos específicos:</a:t>
+            </a:r>
+          </a:p>
+          <a:p>
+            <a:endParaRPr lang="pt-BR" sz="2200" i="1" dirty="0" smtClean="0"/>
+          </a:p>
+          <a:p>
+            <a:pPr marL="457200" indent="-457200">
+              <a:buFont typeface="+mj-lt"/>
+              <a:buAutoNum type="arabicPeriod"/>
+            </a:pPr>
+            <a:r>
+              <a:rPr lang="pt-BR" sz="2200" i="1" dirty="0" smtClean="0"/>
+              <a:t>Definir, e eventualmente construir, a base de imagens que será utilizada;</a:t>
+            </a:r>
+          </a:p>
+          <a:p>
+            <a:pPr marL="457200" indent="-457200">
+              <a:buFont typeface="+mj-lt"/>
+              <a:buAutoNum type="arabicPeriod"/>
+            </a:pPr>
+            <a:r>
+              <a:rPr lang="pt-BR" sz="2200" i="1" dirty="0" smtClean="0"/>
+              <a:t>Realizar revisão </a:t>
+            </a:r>
+            <a:r>
+              <a:rPr lang="pt-BR" sz="2200" i="1" dirty="0" smtClean="0"/>
+              <a:t>bibliográfica de técnicas aplicadas ao tema de pesquisa;</a:t>
+            </a:r>
+          </a:p>
+          <a:p>
+            <a:pPr marL="457200" indent="-457200">
+              <a:buFont typeface="+mj-lt"/>
+              <a:buAutoNum type="arabicPeriod"/>
+            </a:pPr>
+            <a:r>
+              <a:rPr lang="pt-BR" sz="2200" i="1" dirty="0" smtClean="0"/>
+              <a:t>Definir os algoritmos que serão utilizados; </a:t>
+            </a:r>
+          </a:p>
+          <a:p>
+            <a:pPr marL="457200" indent="-457200">
+              <a:buFont typeface="+mj-lt"/>
+              <a:buAutoNum type="arabicPeriod"/>
+            </a:pPr>
+            <a:r>
+              <a:rPr lang="pt-BR" sz="2200" i="1" dirty="0" smtClean="0"/>
+              <a:t>Definir a arquitetura inicial dos algoritmos; </a:t>
+            </a:r>
+            <a:endParaRPr lang="pt-BR" sz="2200" i="1" dirty="0" smtClean="0"/>
+          </a:p>
+          <a:p>
+            <a:pPr marL="457200" indent="-457200">
+              <a:buFont typeface="+mj-lt"/>
+              <a:buAutoNum type="arabicPeriod"/>
+            </a:pPr>
+            <a:r>
+              <a:rPr lang="pt-BR" sz="2200" i="1" dirty="0" smtClean="0"/>
+              <a:t>Construir os modelos;</a:t>
+            </a:r>
+          </a:p>
+          <a:p>
+            <a:pPr marL="457200" indent="-457200">
+              <a:buFont typeface="+mj-lt"/>
+              <a:buAutoNum type="arabicPeriod"/>
+            </a:pPr>
+            <a:r>
+              <a:rPr lang="pt-BR" sz="2200" i="1" dirty="0" smtClean="0"/>
+              <a:t>Realizar o </a:t>
+            </a:r>
+            <a:r>
+              <a:rPr lang="pt-BR" sz="2200" i="1" dirty="0" err="1" smtClean="0"/>
+              <a:t>tunning</a:t>
+            </a:r>
+            <a:r>
+              <a:rPr lang="pt-BR" sz="2200" i="1" dirty="0" smtClean="0"/>
+              <a:t> de hiperparâmetros;</a:t>
+            </a:r>
+          </a:p>
+          <a:p>
+            <a:pPr marL="457200" indent="-457200">
+              <a:buFont typeface="+mj-lt"/>
+              <a:buAutoNum type="arabicPeriod"/>
+            </a:pPr>
+            <a:r>
+              <a:rPr lang="pt-BR" sz="2200" i="1" dirty="0" smtClean="0"/>
+              <a:t>Analisar a performance da solução;</a:t>
+            </a:r>
+          </a:p>
+          <a:p>
+            <a:pPr marL="457200" indent="-457200">
+              <a:buFont typeface="+mj-lt"/>
+              <a:buAutoNum type="arabicPeriod"/>
+            </a:pPr>
+            <a:endParaRPr lang="pt-BR" sz="2200" i="1" dirty="0"/>
           </a:p>
         </p:txBody>
       </p:sp>
     </p:spTree>
     <p:extLst>
       <p:ext uri="{BB962C8B-B14F-4D97-AF65-F5344CB8AC3E}">
-        <p14:creationId xmlns:p14="http://schemas.microsoft.com/office/powerpoint/2010/main" val="3953857876"/>
+        <p14:creationId xmlns="" xmlns:p14="http://schemas.microsoft.com/office/powerpoint/2010/main" val="3953857876"/>
       </p:ext>
     </p:extLst>
   </p:cSld>
@@ -7370,7 +7551,7 @@
           <p:cNvPr id="2" name="CaixaDeTexto 1">
             <a:extLst>
               <a:ext uri="{FF2B5EF4-FFF2-40B4-BE49-F238E27FC236}">
-                <a16:creationId xmlns:a16="http://schemas.microsoft.com/office/drawing/2014/main" id="{E2289C40-6B36-4906-BF6F-3D1B594D6D57}"/>
+                <a16:creationId xmlns="" xmlns:a16="http://schemas.microsoft.com/office/drawing/2014/main" id="{E2289C40-6B36-4906-BF6F-3D1B594D6D57}"/>
               </a:ext>
             </a:extLst>
           </p:cNvPr>
@@ -7409,7 +7590,7 @@
           <p:cNvPr id="5" name="Retângulo 4">
             <a:extLst>
               <a:ext uri="{FF2B5EF4-FFF2-40B4-BE49-F238E27FC236}">
-                <a16:creationId xmlns:a16="http://schemas.microsoft.com/office/drawing/2014/main" id="{C4351BF4-6949-465B-A55A-C8561462CF2E}"/>
+                <a16:creationId xmlns="" xmlns:a16="http://schemas.microsoft.com/office/drawing/2014/main" id="{C4351BF4-6949-465B-A55A-C8561462CF2E}"/>
               </a:ext>
             </a:extLst>
           </p:cNvPr>
@@ -7459,7 +7640,7 @@
           <p:cNvPr id="4" name="CaixaDeTexto 3">
             <a:extLst>
               <a:ext uri="{FF2B5EF4-FFF2-40B4-BE49-F238E27FC236}">
-                <a16:creationId xmlns:a16="http://schemas.microsoft.com/office/drawing/2014/main" id="{201C3BF0-3DB6-45FE-ABB3-0E8206DE61D9}"/>
+                <a16:creationId xmlns="" xmlns:a16="http://schemas.microsoft.com/office/drawing/2014/main" id="{201C3BF0-3DB6-45FE-ABB3-0E8206DE61D9}"/>
               </a:ext>
             </a:extLst>
           </p:cNvPr>
@@ -7495,7 +7676,7 @@
     </p:spTree>
     <p:extLst>
       <p:ext uri="{BB962C8B-B14F-4D97-AF65-F5344CB8AC3E}">
-        <p14:creationId xmlns:p14="http://schemas.microsoft.com/office/powerpoint/2010/main" val="1702763331"/>
+        <p14:creationId xmlns="" xmlns:p14="http://schemas.microsoft.com/office/powerpoint/2010/main" val="1702763331"/>
       </p:ext>
     </p:extLst>
   </p:cSld>
@@ -7527,7 +7708,7 @@
           <p:cNvPr id="2" name="CaixaDeTexto 1">
             <a:extLst>
               <a:ext uri="{FF2B5EF4-FFF2-40B4-BE49-F238E27FC236}">
-                <a16:creationId xmlns:a16="http://schemas.microsoft.com/office/drawing/2014/main" id="{E2289C40-6B36-4906-BF6F-3D1B594D6D57}"/>
+                <a16:creationId xmlns="" xmlns:a16="http://schemas.microsoft.com/office/drawing/2014/main" id="{E2289C40-6B36-4906-BF6F-3D1B594D6D57}"/>
               </a:ext>
             </a:extLst>
           </p:cNvPr>
@@ -7566,7 +7747,7 @@
           <p:cNvPr id="5" name="Retângulo 4">
             <a:extLst>
               <a:ext uri="{FF2B5EF4-FFF2-40B4-BE49-F238E27FC236}">
-                <a16:creationId xmlns:a16="http://schemas.microsoft.com/office/drawing/2014/main" id="{C4351BF4-6949-465B-A55A-C8561462CF2E}"/>
+                <a16:creationId xmlns="" xmlns:a16="http://schemas.microsoft.com/office/drawing/2014/main" id="{C4351BF4-6949-465B-A55A-C8561462CF2E}"/>
               </a:ext>
             </a:extLst>
           </p:cNvPr>
@@ -7632,7 +7813,7 @@
           <p:cNvPr id="4" name="CaixaDeTexto 3">
             <a:extLst>
               <a:ext uri="{FF2B5EF4-FFF2-40B4-BE49-F238E27FC236}">
-                <a16:creationId xmlns:a16="http://schemas.microsoft.com/office/drawing/2014/main" id="{E4CC8CAB-3F4C-409C-8745-BB5BD7AF0FCB}"/>
+                <a16:creationId xmlns="" xmlns:a16="http://schemas.microsoft.com/office/drawing/2014/main" id="{E4CC8CAB-3F4C-409C-8745-BB5BD7AF0FCB}"/>
               </a:ext>
             </a:extLst>
           </p:cNvPr>
@@ -7668,7 +7849,7 @@
     </p:spTree>
     <p:extLst>
       <p:ext uri="{BB962C8B-B14F-4D97-AF65-F5344CB8AC3E}">
-        <p14:creationId xmlns:p14="http://schemas.microsoft.com/office/powerpoint/2010/main" val="1752641579"/>
+        <p14:creationId xmlns="" xmlns:p14="http://schemas.microsoft.com/office/powerpoint/2010/main" val="1752641579"/>
       </p:ext>
     </p:extLst>
   </p:cSld>
@@ -7700,7 +7881,7 @@
           <p:cNvPr id="2" name="CaixaDeTexto 1">
             <a:extLst>
               <a:ext uri="{FF2B5EF4-FFF2-40B4-BE49-F238E27FC236}">
-                <a16:creationId xmlns:a16="http://schemas.microsoft.com/office/drawing/2014/main" id="{E2289C40-6B36-4906-BF6F-3D1B594D6D57}"/>
+                <a16:creationId xmlns="" xmlns:a16="http://schemas.microsoft.com/office/drawing/2014/main" id="{E2289C40-6B36-4906-BF6F-3D1B594D6D57}"/>
               </a:ext>
             </a:extLst>
           </p:cNvPr>
@@ -7763,7 +7944,7 @@
           <p:cNvPr id="3" name="Retângulo 2">
             <a:extLst>
               <a:ext uri="{FF2B5EF4-FFF2-40B4-BE49-F238E27FC236}">
-                <a16:creationId xmlns:a16="http://schemas.microsoft.com/office/drawing/2014/main" id="{174208DE-0C00-40F4-A31A-3BC0AEE1B5CE}"/>
+                <a16:creationId xmlns="" xmlns:a16="http://schemas.microsoft.com/office/drawing/2014/main" id="{174208DE-0C00-40F4-A31A-3BC0AEE1B5CE}"/>
               </a:ext>
             </a:extLst>
           </p:cNvPr>
@@ -7821,7 +8002,7 @@
           <p:cNvPr id="4" name="CaixaDeTexto 3">
             <a:extLst>
               <a:ext uri="{FF2B5EF4-FFF2-40B4-BE49-F238E27FC236}">
-                <a16:creationId xmlns:a16="http://schemas.microsoft.com/office/drawing/2014/main" id="{F523F8A5-43AB-4AB2-BB4F-7F4A30E4A077}"/>
+                <a16:creationId xmlns="" xmlns:a16="http://schemas.microsoft.com/office/drawing/2014/main" id="{F523F8A5-43AB-4AB2-BB4F-7F4A30E4A077}"/>
               </a:ext>
             </a:extLst>
           </p:cNvPr>
@@ -7857,7 +8038,7 @@
     </p:spTree>
     <p:extLst>
       <p:ext uri="{BB962C8B-B14F-4D97-AF65-F5344CB8AC3E}">
-        <p14:creationId xmlns:p14="http://schemas.microsoft.com/office/powerpoint/2010/main" val="599003997"/>
+        <p14:creationId xmlns="" xmlns:p14="http://schemas.microsoft.com/office/powerpoint/2010/main" val="599003997"/>
       </p:ext>
     </p:extLst>
   </p:cSld>
@@ -7910,7 +8091,7 @@
     </a:clrScheme>
     <a:fontScheme name="Office">
       <a:majorFont>
-        <a:latin typeface="Calibri Light" panose="020F0302020204030204"/>
+        <a:latin typeface="Calibri Light"/>
         <a:ea typeface=""/>
         <a:cs typeface=""/>
         <a:font script="Jpan" typeface="游ゴシック Light"/>
@@ -7962,7 +8143,7 @@
         <a:font script="Tfng" typeface="Ebrima"/>
       </a:majorFont>
       <a:minorFont>
-        <a:latin typeface="Calibri" panose="020F0502020204030204"/>
+        <a:latin typeface="Calibri"/>
         <a:ea typeface=""/>
         <a:cs typeface=""/>
         <a:font script="Jpan" typeface="游ゴシック"/>
@@ -8156,7 +8337,7 @@
   <a:extraClrSchemeLst/>
   <a:extLst>
     <a:ext uri="{05A4C25C-085E-4340-85A3-A5531E510DB2}">
-      <thm15:themeFamily xmlns:thm15="http://schemas.microsoft.com/office/thememl/2012/main" name="Office Theme" id="{62F939B6-93AF-4DB8-9C6B-D6C7DFDC589F}" vid="{4A3C46E8-61CC-4603-A589-7422A47A8E4A}"/>
+      <thm15:themeFamily xmlns="" xmlns:thm15="http://schemas.microsoft.com/office/thememl/2012/main" name="Office Theme" id="{62F939B6-93AF-4DB8-9C6B-D6C7DFDC589F}" vid="{4A3C46E8-61CC-4603-A589-7422A47A8E4A}"/>
     </a:ext>
   </a:extLst>
 </a:theme>
@@ -8205,7 +8386,7 @@
     </a:clrScheme>
     <a:fontScheme name="Office">
       <a:majorFont>
-        <a:latin typeface="Calibri Light" panose="020F0302020204030204"/>
+        <a:latin typeface="Calibri Light"/>
         <a:ea typeface=""/>
         <a:cs typeface=""/>
         <a:font script="Jpan" typeface="游ゴシック Light"/>
@@ -8257,7 +8438,7 @@
         <a:font script="Tfng" typeface="Ebrima"/>
       </a:majorFont>
       <a:minorFont>
-        <a:latin typeface="Calibri" panose="020F0502020204030204"/>
+        <a:latin typeface="Calibri"/>
         <a:ea typeface=""/>
         <a:cs typeface=""/>
         <a:font script="Jpan" typeface="游ゴシック"/>
@@ -8451,7 +8632,7 @@
   <a:extraClrSchemeLst/>
   <a:extLst>
     <a:ext uri="{05A4C25C-085E-4340-85A3-A5531E510DB2}">
-      <thm15:themeFamily xmlns:thm15="http://schemas.microsoft.com/office/thememl/2012/main" name="Office Theme" id="{62F939B6-93AF-4DB8-9C6B-D6C7DFDC589F}" vid="{4A3C46E8-61CC-4603-A589-7422A47A8E4A}"/>
+      <thm15:themeFamily xmlns="" xmlns:thm15="http://schemas.microsoft.com/office/thememl/2012/main" name="Office Theme" id="{62F939B6-93AF-4DB8-9C6B-D6C7DFDC589F}" vid="{4A3C46E8-61CC-4603-A589-7422A47A8E4A}"/>
     </a:ext>
   </a:extLst>
 </a:theme>
@@ -8500,7 +8681,7 @@
     </a:clrScheme>
     <a:fontScheme name="Office">
       <a:majorFont>
-        <a:latin typeface="Calibri Light" panose="020F0302020204030204"/>
+        <a:latin typeface="Calibri Light"/>
         <a:ea typeface=""/>
         <a:cs typeface=""/>
         <a:font script="Jpan" typeface="游ゴシック Light"/>
@@ -8552,7 +8733,7 @@
         <a:font script="Tfng" typeface="Ebrima"/>
       </a:majorFont>
       <a:minorFont>
-        <a:latin typeface="Calibri" panose="020F0502020204030204"/>
+        <a:latin typeface="Calibri"/>
         <a:ea typeface=""/>
         <a:cs typeface=""/>
         <a:font script="Jpan" typeface="游ゴシック"/>
@@ -8746,7 +8927,7 @@
   <a:extraClrSchemeLst/>
   <a:extLst>
     <a:ext uri="{05A4C25C-085E-4340-85A3-A5531E510DB2}">
-      <thm15:themeFamily xmlns:thm15="http://schemas.microsoft.com/office/thememl/2012/main" name="Office Theme" id="{62F939B6-93AF-4DB8-9C6B-D6C7DFDC589F}" vid="{4A3C46E8-61CC-4603-A589-7422A47A8E4A}"/>
+      <thm15:themeFamily xmlns="" xmlns:thm15="http://schemas.microsoft.com/office/thememl/2012/main" name="Office Theme" id="{62F939B6-93AF-4DB8-9C6B-D6C7DFDC589F}" vid="{4A3C46E8-61CC-4603-A589-7422A47A8E4A}"/>
     </a:ext>
   </a:extLst>
 </a:theme>
@@ -8795,7 +8976,7 @@
     </a:clrScheme>
     <a:fontScheme name="Escritório">
       <a:majorFont>
-        <a:latin typeface="Calibri Light" panose="020F0302020204030204"/>
+        <a:latin typeface="Calibri Light"/>
         <a:ea typeface=""/>
         <a:cs typeface=""/>
         <a:font script="Jpan" typeface="ＭＳ Ｐゴシック"/>
@@ -8830,7 +9011,7 @@
         <a:font script="Geor" typeface="Sylfaen"/>
       </a:majorFont>
       <a:minorFont>
-        <a:latin typeface="Calibri" panose="020F0502020204030204"/>
+        <a:latin typeface="Calibri"/>
         <a:ea typeface=""/>
         <a:cs typeface=""/>
         <a:font script="Jpan" typeface="ＭＳ Ｐゴシック"/>
@@ -9007,7 +9188,7 @@
   <a:extraClrSchemeLst/>
   <a:extLst>
     <a:ext uri="{05A4C25C-085E-4340-85A3-A5531E510DB2}">
-      <thm15:themeFamily xmlns:thm15="http://schemas.microsoft.com/office/thememl/2012/main" name="Office Theme" id="{62F939B6-93AF-4DB8-9C6B-D6C7DFDC589F}" vid="{4A3C46E8-61CC-4603-A589-7422A47A8E4A}"/>
+      <thm15:themeFamily xmlns="" xmlns:thm15="http://schemas.microsoft.com/office/thememl/2012/main" name="Office Theme" id="{62F939B6-93AF-4DB8-9C6B-D6C7DFDC589F}" vid="{4A3C46E8-61CC-4603-A589-7422A47A8E4A}"/>
     </a:ext>
   </a:extLst>
 </a:theme>
@@ -9056,7 +9237,7 @@
     </a:clrScheme>
     <a:fontScheme name="Office">
       <a:majorFont>
-        <a:latin typeface="Calibri Light" panose="020F0302020204030204"/>
+        <a:latin typeface="Calibri Light"/>
         <a:ea typeface=""/>
         <a:cs typeface=""/>
         <a:font script="Jpan" typeface="游ゴシック Light"/>
@@ -9108,7 +9289,7 @@
         <a:font script="Tfng" typeface="Ebrima"/>
       </a:majorFont>
       <a:minorFont>
-        <a:latin typeface="Calibri" panose="020F0502020204030204"/>
+        <a:latin typeface="Calibri"/>
         <a:ea typeface=""/>
         <a:cs typeface=""/>
         <a:font script="Jpan" typeface="游ゴシック"/>
@@ -9302,7 +9483,7 @@
   <a:extraClrSchemeLst/>
   <a:extLst>
     <a:ext uri="{05A4C25C-085E-4340-85A3-A5531E510DB2}">
-      <thm15:themeFamily xmlns:thm15="http://schemas.microsoft.com/office/thememl/2012/main" name="Office Theme" id="{62F939B6-93AF-4DB8-9C6B-D6C7DFDC589F}" vid="{4A3C46E8-61CC-4603-A589-7422A47A8E4A}"/>
+      <thm15:themeFamily xmlns="" xmlns:thm15="http://schemas.microsoft.com/office/thememl/2012/main" name="Office Theme" id="{62F939B6-93AF-4DB8-9C6B-D6C7DFDC589F}" vid="{4A3C46E8-61CC-4603-A589-7422A47A8E4A}"/>
     </a:ext>
   </a:extLst>
 </a:theme>

</xml_diff>